<commit_message>
polishing the note book and finishing the powerpoint
</commit_message>
<xml_diff>
--- a/Presentation/Project Presentation.pptx
+++ b/Presentation/Project Presentation.pptx
@@ -5,24 +5,39 @@
     <p:sldMasterId id="2147483648" r:id="rId1"/>
   </p:sldMasterIdLst>
   <p:notesMasterIdLst>
-    <p:notesMasterId r:id="rId17"/>
+    <p:notesMasterId r:id="rId32"/>
   </p:notesMasterIdLst>
   <p:sldIdLst>
     <p:sldId id="256" r:id="rId2"/>
     <p:sldId id="258" r:id="rId3"/>
     <p:sldId id="257" r:id="rId4"/>
-    <p:sldId id="259" r:id="rId5"/>
-    <p:sldId id="260" r:id="rId6"/>
-    <p:sldId id="261" r:id="rId7"/>
-    <p:sldId id="262" r:id="rId8"/>
-    <p:sldId id="265" r:id="rId9"/>
-    <p:sldId id="266" r:id="rId10"/>
-    <p:sldId id="267" r:id="rId11"/>
-    <p:sldId id="268" r:id="rId12"/>
-    <p:sldId id="263" r:id="rId13"/>
-    <p:sldId id="264" r:id="rId14"/>
-    <p:sldId id="269" r:id="rId15"/>
-    <p:sldId id="270" r:id="rId16"/>
+    <p:sldId id="271" r:id="rId5"/>
+    <p:sldId id="259" r:id="rId6"/>
+    <p:sldId id="260" r:id="rId7"/>
+    <p:sldId id="273" r:id="rId8"/>
+    <p:sldId id="261" r:id="rId9"/>
+    <p:sldId id="274" r:id="rId10"/>
+    <p:sldId id="276" r:id="rId11"/>
+    <p:sldId id="277" r:id="rId12"/>
+    <p:sldId id="275" r:id="rId13"/>
+    <p:sldId id="278" r:id="rId14"/>
+    <p:sldId id="282" r:id="rId15"/>
+    <p:sldId id="283" r:id="rId16"/>
+    <p:sldId id="265" r:id="rId17"/>
+    <p:sldId id="281" r:id="rId18"/>
+    <p:sldId id="285" r:id="rId19"/>
+    <p:sldId id="284" r:id="rId20"/>
+    <p:sldId id="286" r:id="rId21"/>
+    <p:sldId id="280" r:id="rId22"/>
+    <p:sldId id="287" r:id="rId23"/>
+    <p:sldId id="263" r:id="rId24"/>
+    <p:sldId id="288" r:id="rId25"/>
+    <p:sldId id="289" r:id="rId26"/>
+    <p:sldId id="290" r:id="rId27"/>
+    <p:sldId id="291" r:id="rId28"/>
+    <p:sldId id="269" r:id="rId29"/>
+    <p:sldId id="292" r:id="rId30"/>
+    <p:sldId id="270" r:id="rId31"/>
   </p:sldIdLst>
   <p:sldSz cx="12192000" cy="6858000"/>
   <p:notesSz cx="6858000" cy="9144000"/>
@@ -211,7 +226,7 @@
           <a:p>
             <a:fld id="{2B12A7B0-6ED2-4F21-ADA1-F694280CB390}" type="datetimeFigureOut">
               <a:rPr lang="en-US" smtClean="0"/>
-              <a:t>12/25/2022</a:t>
+              <a:t>12/26/2022</a:t>
             </a:fld>
             <a:endParaRPr lang="en-US"/>
           </a:p>
@@ -625,7 +640,7 @@
           <a:p>
             <a:fld id="{A429667E-C24E-43B9-8AA6-DA3D1F4F7A8F}" type="datetime1">
               <a:rPr lang="en-US" smtClean="0"/>
-              <a:t>12/25/2022</a:t>
+              <a:t>12/26/2022</a:t>
             </a:fld>
             <a:endParaRPr lang="en-US"/>
           </a:p>
@@ -823,7 +838,7 @@
           <a:p>
             <a:fld id="{6A784AF5-049B-4C29-BE18-6A0A8240DFBE}" type="datetime1">
               <a:rPr lang="en-US" smtClean="0"/>
-              <a:t>12/25/2022</a:t>
+              <a:t>12/26/2022</a:t>
             </a:fld>
             <a:endParaRPr lang="en-US"/>
           </a:p>
@@ -1031,7 +1046,7 @@
           <a:p>
             <a:fld id="{B08C5A5A-F525-4101-BABF-4A3A8FBA2A78}" type="datetime1">
               <a:rPr lang="en-US" smtClean="0"/>
-              <a:t>12/25/2022</a:t>
+              <a:t>12/26/2022</a:t>
             </a:fld>
             <a:endParaRPr lang="en-US"/>
           </a:p>
@@ -1229,7 +1244,7 @@
           <a:p>
             <a:fld id="{D0D27202-49FF-4800-9E5F-441113C17778}" type="datetime1">
               <a:rPr lang="en-US" smtClean="0"/>
-              <a:t>12/25/2022</a:t>
+              <a:t>12/26/2022</a:t>
             </a:fld>
             <a:endParaRPr lang="en-US"/>
           </a:p>
@@ -1504,7 +1519,7 @@
           <a:p>
             <a:fld id="{E5712B97-EFCD-4014-AE97-AA27F6ED6DD2}" type="datetime1">
               <a:rPr lang="en-US" smtClean="0"/>
-              <a:t>12/25/2022</a:t>
+              <a:t>12/26/2022</a:t>
             </a:fld>
             <a:endParaRPr lang="en-US"/>
           </a:p>
@@ -1769,7 +1784,7 @@
           <a:p>
             <a:fld id="{92F5AF90-842E-4CF5-9648-0E55EED0F2FD}" type="datetime1">
               <a:rPr lang="en-US" smtClean="0"/>
-              <a:t>12/25/2022</a:t>
+              <a:t>12/26/2022</a:t>
             </a:fld>
             <a:endParaRPr lang="en-US"/>
           </a:p>
@@ -2181,7 +2196,7 @@
           <a:p>
             <a:fld id="{EAEFF86A-4C34-4EC2-88D8-4CF592FF9501}" type="datetime1">
               <a:rPr lang="en-US" smtClean="0"/>
-              <a:t>12/25/2022</a:t>
+              <a:t>12/26/2022</a:t>
             </a:fld>
             <a:endParaRPr lang="en-US"/>
           </a:p>
@@ -2322,7 +2337,7 @@
           <a:p>
             <a:fld id="{6F6703EB-872A-40D1-8249-CBAA2D367566}" type="datetime1">
               <a:rPr lang="en-US" smtClean="0"/>
-              <a:t>12/25/2022</a:t>
+              <a:t>12/26/2022</a:t>
             </a:fld>
             <a:endParaRPr lang="en-US"/>
           </a:p>
@@ -2435,7 +2450,7 @@
           <a:p>
             <a:fld id="{E94D11A8-7742-439A-9684-172FB6C4E910}" type="datetime1">
               <a:rPr lang="en-US" smtClean="0"/>
-              <a:t>12/25/2022</a:t>
+              <a:t>12/26/2022</a:t>
             </a:fld>
             <a:endParaRPr lang="en-US"/>
           </a:p>
@@ -2746,7 +2761,7 @@
           <a:p>
             <a:fld id="{D4457E92-4357-48D6-A96E-B9D8E01AB277}" type="datetime1">
               <a:rPr lang="en-US" smtClean="0"/>
-              <a:t>12/25/2022</a:t>
+              <a:t>12/26/2022</a:t>
             </a:fld>
             <a:endParaRPr lang="en-US"/>
           </a:p>
@@ -3034,7 +3049,7 @@
           <a:p>
             <a:fld id="{A5C48918-EFF3-4557-B785-32AFFDF2A659}" type="datetime1">
               <a:rPr lang="en-US" smtClean="0"/>
-              <a:t>12/25/2022</a:t>
+              <a:t>12/26/2022</a:t>
             </a:fld>
             <a:endParaRPr lang="en-US"/>
           </a:p>
@@ -3275,7 +3290,7 @@
           <a:p>
             <a:fld id="{37CF8DFF-130E-49BD-B06D-34D307E02EEE}" type="datetime1">
               <a:rPr lang="en-US" smtClean="0"/>
-              <a:t>12/25/2022</a:t>
+              <a:t>12/26/2022</a:t>
             </a:fld>
             <a:endParaRPr lang="en-US"/>
           </a:p>
@@ -3709,23 +3724,30 @@
             <p:ph type="ctrTitle"/>
           </p:nvPr>
         </p:nvSpPr>
-        <p:spPr/>
-        <p:txBody>
-          <a:bodyPr/>
-          <a:lstStyle/>
-          <a:p>
-            <a:r>
-              <a:rPr lang="en-US" dirty="0"/>
+        <p:spPr>
+          <a:xfrm>
+            <a:off x="1524000" y="1041400"/>
+            <a:ext cx="9144000" cy="2387600"/>
+          </a:xfrm>
+        </p:spPr>
+        <p:txBody>
+          <a:bodyPr>
+            <a:noAutofit/>
+          </a:bodyPr>
+          <a:lstStyle/>
+          <a:p>
+            <a:r>
+              <a:rPr lang="en-US" sz="5800" dirty="0"/>
               <a:t>Data Science CSCI 3320</a:t>
             </a:r>
             <a:br>
-              <a:rPr lang="en-US" dirty="0"/>
+              <a:rPr lang="en-US" sz="5800" dirty="0"/>
             </a:br>
             <a:r>
-              <a:rPr lang="en-US" dirty="0"/>
-              <a:t>Project: Oil-Spill</a:t>
-            </a:r>
-            <a:endParaRPr lang="en-US" dirty="0">
+              <a:rPr lang="en-US" sz="5800" dirty="0"/>
+              <a:t>Project: Oil-Spill Classification</a:t>
+            </a:r>
+            <a:endParaRPr lang="en-US" sz="5800" dirty="0">
               <a:highlight>
                 <a:srgbClr val="FFFF00"/>
               </a:highlight>
@@ -3855,10 +3877,10 @@
       </p:grpSpPr>
       <p:sp>
         <p:nvSpPr>
-          <p:cNvPr id="4" name="Title 3">
-            <a:extLst>
-              <a:ext uri="{FF2B5EF4-FFF2-40B4-BE49-F238E27FC236}">
-                <a16:creationId xmlns:a16="http://schemas.microsoft.com/office/drawing/2014/main" id="{A8348381-F94E-1E08-559A-B780DCA65C20}"/>
+          <p:cNvPr id="2" name="Title 1">
+            <a:extLst>
+              <a:ext uri="{FF2B5EF4-FFF2-40B4-BE49-F238E27FC236}">
+                <a16:creationId xmlns:a16="http://schemas.microsoft.com/office/drawing/2014/main" id="{B33F48E1-CC57-F8C2-D921-AB99FBBD719A}"/>
               </a:ext>
             </a:extLst>
           </p:cNvPr>
@@ -3876,17 +3898,52 @@
           <a:p>
             <a:r>
               <a:rPr lang="en-US" dirty="0"/>
-              <a:t>Descriptive Analytics </a:t>
-            </a:r>
-          </a:p>
-        </p:txBody>
-      </p:sp>
-      <p:sp>
-        <p:nvSpPr>
-          <p:cNvPr id="2" name="Slide Number Placeholder 1">
-            <a:extLst>
-              <a:ext uri="{FF2B5EF4-FFF2-40B4-BE49-F238E27FC236}">
-                <a16:creationId xmlns:a16="http://schemas.microsoft.com/office/drawing/2014/main" id="{1C043AB8-C7E4-B651-631A-7ED72CF66420}"/>
+              <a:t>Data Exploration </a:t>
+            </a:r>
+          </a:p>
+        </p:txBody>
+      </p:sp>
+      <p:pic>
+        <p:nvPicPr>
+          <p:cNvPr id="6" name="Content Placeholder 5">
+            <a:extLst>
+              <a:ext uri="{FF2B5EF4-FFF2-40B4-BE49-F238E27FC236}">
+                <a16:creationId xmlns:a16="http://schemas.microsoft.com/office/drawing/2014/main" id="{0A4410CD-87CA-6543-4B5D-2948C7C0FFAB}"/>
+              </a:ext>
+            </a:extLst>
+          </p:cNvPr>
+          <p:cNvPicPr>
+            <a:picLocks noGrp="1" noChangeAspect="1"/>
+          </p:cNvPicPr>
+          <p:nvPr>
+            <p:ph idx="1"/>
+          </p:nvPr>
+        </p:nvPicPr>
+        <p:blipFill>
+          <a:blip r:embed="rId2">
+            <a:extLst>
+              <a:ext uri="{28A0092B-C50C-407E-A947-70E740481C1C}">
+                <a14:useLocalDpi xmlns:a14="http://schemas.microsoft.com/office/drawing/2010/main" val="0"/>
+              </a:ext>
+            </a:extLst>
+          </a:blip>
+          <a:stretch>
+            <a:fillRect/>
+          </a:stretch>
+        </p:blipFill>
+        <p:spPr>
+          <a:xfrm>
+            <a:off x="1149719" y="1825625"/>
+            <a:ext cx="9892562" cy="4351338"/>
+          </a:xfrm>
+        </p:spPr>
+      </p:pic>
+      <p:sp>
+        <p:nvSpPr>
+          <p:cNvPr id="4" name="Slide Number Placeholder 3">
+            <a:extLst>
+              <a:ext uri="{FF2B5EF4-FFF2-40B4-BE49-F238E27FC236}">
+                <a16:creationId xmlns:a16="http://schemas.microsoft.com/office/drawing/2014/main" id="{0D4ABF73-D649-EDAF-B828-2D2C45F47BAB}"/>
               </a:ext>
             </a:extLst>
           </p:cNvPr>
@@ -3913,7 +3970,7 @@
     </p:spTree>
     <p:extLst>
       <p:ext uri="{BB962C8B-B14F-4D97-AF65-F5344CB8AC3E}">
-        <p14:creationId xmlns:p14="http://schemas.microsoft.com/office/powerpoint/2010/main" val="650729950"/>
+        <p14:creationId xmlns:p14="http://schemas.microsoft.com/office/powerpoint/2010/main" val="924697293"/>
       </p:ext>
     </p:extLst>
   </p:cSld>
@@ -3945,7 +4002,7 @@
           <p:cNvPr id="2" name="Title 1">
             <a:extLst>
               <a:ext uri="{FF2B5EF4-FFF2-40B4-BE49-F238E27FC236}">
-                <a16:creationId xmlns:a16="http://schemas.microsoft.com/office/drawing/2014/main" id="{43EE6C72-03D5-F7F0-1189-4C7BA75BAA61}"/>
+                <a16:creationId xmlns:a16="http://schemas.microsoft.com/office/drawing/2014/main" id="{23D311D3-C040-E85B-CF16-F4A9B62FB899}"/>
               </a:ext>
             </a:extLst>
           </p:cNvPr>
@@ -3963,106 +4020,52 @@
           <a:p>
             <a:r>
               <a:rPr lang="en-US" dirty="0"/>
-              <a:t>Descriptive analytics </a:t>
-            </a:r>
-          </a:p>
-        </p:txBody>
-      </p:sp>
-      <p:sp>
-        <p:nvSpPr>
-          <p:cNvPr id="3" name="Content Placeholder 2">
-            <a:extLst>
-              <a:ext uri="{FF2B5EF4-FFF2-40B4-BE49-F238E27FC236}">
-                <a16:creationId xmlns:a16="http://schemas.microsoft.com/office/drawing/2014/main" id="{2CAC2674-75A1-6757-F8C2-5CD61FD6D8AE}"/>
-              </a:ext>
-            </a:extLst>
-          </p:cNvPr>
-          <p:cNvSpPr>
-            <a:spLocks noGrp="1"/>
-          </p:cNvSpPr>
+              <a:t>Data Exploration </a:t>
+            </a:r>
+          </a:p>
+        </p:txBody>
+      </p:sp>
+      <p:pic>
+        <p:nvPicPr>
+          <p:cNvPr id="6" name="Content Placeholder 5">
+            <a:extLst>
+              <a:ext uri="{FF2B5EF4-FFF2-40B4-BE49-F238E27FC236}">
+                <a16:creationId xmlns:a16="http://schemas.microsoft.com/office/drawing/2014/main" id="{1FE191D0-C837-7F06-1E18-7EEBB37B16B9}"/>
+              </a:ext>
+            </a:extLst>
+          </p:cNvPr>
+          <p:cNvPicPr>
+            <a:picLocks noGrp="1" noChangeAspect="1"/>
+          </p:cNvPicPr>
           <p:nvPr>
             <p:ph idx="1"/>
           </p:nvPr>
-        </p:nvSpPr>
-        <p:spPr/>
-        <p:txBody>
-          <a:bodyPr/>
-          <a:lstStyle/>
-          <a:p>
-            <a:r>
-              <a:rPr lang="en-US" dirty="0">
-                <a:highlight>
-                  <a:srgbClr val="FFFF00"/>
-                </a:highlight>
-              </a:rPr>
-              <a:t>Use clustering and association rules to describe the data</a:t>
-            </a:r>
-          </a:p>
-          <a:p>
-            <a:r>
-              <a:rPr lang="en-US" dirty="0">
-                <a:highlight>
-                  <a:srgbClr val="FFFF00"/>
-                </a:highlight>
-              </a:rPr>
-              <a:t>Include KNIME workflow (screenshots) </a:t>
-            </a:r>
-          </a:p>
-          <a:p>
-            <a:r>
-              <a:rPr lang="en-US" dirty="0">
-                <a:highlight>
-                  <a:srgbClr val="FFFF00"/>
-                </a:highlight>
-              </a:rPr>
-              <a:t>What are the findings? </a:t>
-            </a:r>
-          </a:p>
-          <a:p>
-            <a:r>
-              <a:rPr lang="en-US" dirty="0">
-                <a:highlight>
-                  <a:srgbClr val="FFFF00"/>
-                </a:highlight>
-              </a:rPr>
-              <a:t>Evaluate results</a:t>
-            </a:r>
-          </a:p>
-          <a:p>
-            <a:r>
-              <a:rPr lang="en-US" dirty="0">
-                <a:highlight>
-                  <a:srgbClr val="FFFF00"/>
-                </a:highlight>
-              </a:rPr>
-              <a:t>Add slides as you want </a:t>
-            </a:r>
-          </a:p>
-          <a:p>
-            <a:pPr marL="0" indent="0">
-              <a:buNone/>
-            </a:pPr>
-            <a:endParaRPr lang="en-US" dirty="0">
-              <a:highlight>
-                <a:srgbClr val="FFFF00"/>
-              </a:highlight>
-            </a:endParaRPr>
-          </a:p>
-          <a:p>
-            <a:endParaRPr lang="en-US" dirty="0">
-              <a:highlight>
-                <a:srgbClr val="FFFF00"/>
-              </a:highlight>
-            </a:endParaRPr>
-          </a:p>
-        </p:txBody>
-      </p:sp>
+        </p:nvPicPr>
+        <p:blipFill>
+          <a:blip r:embed="rId2">
+            <a:extLst>
+              <a:ext uri="{28A0092B-C50C-407E-A947-70E740481C1C}">
+                <a14:useLocalDpi xmlns:a14="http://schemas.microsoft.com/office/drawing/2010/main" val="0"/>
+              </a:ext>
+            </a:extLst>
+          </a:blip>
+          <a:stretch>
+            <a:fillRect/>
+          </a:stretch>
+        </p:blipFill>
+        <p:spPr>
+          <a:xfrm>
+            <a:off x="838200" y="1873603"/>
+            <a:ext cx="9913502" cy="2149916"/>
+          </a:xfrm>
+        </p:spPr>
+      </p:pic>
       <p:sp>
         <p:nvSpPr>
           <p:cNvPr id="4" name="Slide Number Placeholder 3">
             <a:extLst>
               <a:ext uri="{FF2B5EF4-FFF2-40B4-BE49-F238E27FC236}">
-                <a16:creationId xmlns:a16="http://schemas.microsoft.com/office/drawing/2014/main" id="{6E7402AE-3162-E566-6569-94049FBDD12C}"/>
+                <a16:creationId xmlns:a16="http://schemas.microsoft.com/office/drawing/2014/main" id="{5C5A5A40-8E1A-F789-CBEA-274230482D13}"/>
               </a:ext>
             </a:extLst>
           </p:cNvPr>
@@ -4089,7 +4092,7 @@
     </p:spTree>
     <p:extLst>
       <p:ext uri="{BB962C8B-B14F-4D97-AF65-F5344CB8AC3E}">
-        <p14:creationId xmlns:p14="http://schemas.microsoft.com/office/powerpoint/2010/main" val="2248834242"/>
+        <p14:creationId xmlns:p14="http://schemas.microsoft.com/office/powerpoint/2010/main" val="1161508165"/>
       </p:ext>
     </p:extLst>
   </p:cSld>
@@ -4118,10 +4121,10 @@
       </p:grpSpPr>
       <p:sp>
         <p:nvSpPr>
-          <p:cNvPr id="4" name="Title 3">
-            <a:extLst>
-              <a:ext uri="{FF2B5EF4-FFF2-40B4-BE49-F238E27FC236}">
-                <a16:creationId xmlns:a16="http://schemas.microsoft.com/office/drawing/2014/main" id="{A8348381-F94E-1E08-559A-B780DCA65C20}"/>
+          <p:cNvPr id="2" name="Title 1">
+            <a:extLst>
+              <a:ext uri="{FF2B5EF4-FFF2-40B4-BE49-F238E27FC236}">
+                <a16:creationId xmlns:a16="http://schemas.microsoft.com/office/drawing/2014/main" id="{43EE6C72-03D5-F7F0-1189-4C7BA75BAA61}"/>
               </a:ext>
             </a:extLst>
           </p:cNvPr>
@@ -4139,17 +4142,52 @@
           <a:p>
             <a:r>
               <a:rPr lang="en-US" dirty="0"/>
-              <a:t>Predictive Analytics </a:t>
-            </a:r>
-          </a:p>
-        </p:txBody>
-      </p:sp>
-      <p:sp>
-        <p:nvSpPr>
-          <p:cNvPr id="2" name="Slide Number Placeholder 1">
-            <a:extLst>
-              <a:ext uri="{FF2B5EF4-FFF2-40B4-BE49-F238E27FC236}">
-                <a16:creationId xmlns:a16="http://schemas.microsoft.com/office/drawing/2014/main" id="{0DD0E005-37CB-96D0-B550-B0EF82B0AFEB}"/>
+              <a:t>Data Visualization</a:t>
+            </a:r>
+          </a:p>
+        </p:txBody>
+      </p:sp>
+      <p:pic>
+        <p:nvPicPr>
+          <p:cNvPr id="6" name="Content Placeholder 5">
+            <a:extLst>
+              <a:ext uri="{FF2B5EF4-FFF2-40B4-BE49-F238E27FC236}">
+                <a16:creationId xmlns:a16="http://schemas.microsoft.com/office/drawing/2014/main" id="{896BAF40-4102-76A3-099E-8C2D3BEAA90E}"/>
+              </a:ext>
+            </a:extLst>
+          </p:cNvPr>
+          <p:cNvPicPr>
+            <a:picLocks noGrp="1" noChangeAspect="1"/>
+          </p:cNvPicPr>
+          <p:nvPr>
+            <p:ph idx="1"/>
+          </p:nvPr>
+        </p:nvPicPr>
+        <p:blipFill>
+          <a:blip r:embed="rId2">
+            <a:extLst>
+              <a:ext uri="{28A0092B-C50C-407E-A947-70E740481C1C}">
+                <a14:useLocalDpi xmlns:a14="http://schemas.microsoft.com/office/drawing/2010/main" val="0"/>
+              </a:ext>
+            </a:extLst>
+          </a:blip>
+          <a:stretch>
+            <a:fillRect/>
+          </a:stretch>
+        </p:blipFill>
+        <p:spPr>
+          <a:xfrm>
+            <a:off x="2396563" y="1424122"/>
+            <a:ext cx="7398873" cy="4678701"/>
+          </a:xfrm>
+        </p:spPr>
+      </p:pic>
+      <p:sp>
+        <p:nvSpPr>
+          <p:cNvPr id="4" name="Slide Number Placeholder 3">
+            <a:extLst>
+              <a:ext uri="{FF2B5EF4-FFF2-40B4-BE49-F238E27FC236}">
+                <a16:creationId xmlns:a16="http://schemas.microsoft.com/office/drawing/2014/main" id="{AB66E3E2-AAD8-F512-2126-60AF9A4F7C65}"/>
               </a:ext>
             </a:extLst>
           </p:cNvPr>
@@ -4176,7 +4214,7 @@
     </p:spTree>
     <p:extLst>
       <p:ext uri="{BB962C8B-B14F-4D97-AF65-F5344CB8AC3E}">
-        <p14:creationId xmlns:p14="http://schemas.microsoft.com/office/powerpoint/2010/main" val="3752500180"/>
+        <p14:creationId xmlns:p14="http://schemas.microsoft.com/office/powerpoint/2010/main" val="2961832041"/>
       </p:ext>
     </p:extLst>
   </p:cSld>
@@ -4226,101 +4264,8 @@
           <a:p>
             <a:r>
               <a:rPr lang="en-US" dirty="0"/>
-              <a:t>Predictive analytics </a:t>
-            </a:r>
-          </a:p>
-        </p:txBody>
-      </p:sp>
-      <p:sp>
-        <p:nvSpPr>
-          <p:cNvPr id="3" name="Content Placeholder 2">
-            <a:extLst>
-              <a:ext uri="{FF2B5EF4-FFF2-40B4-BE49-F238E27FC236}">
-                <a16:creationId xmlns:a16="http://schemas.microsoft.com/office/drawing/2014/main" id="{2CAC2674-75A1-6757-F8C2-5CD61FD6D8AE}"/>
-              </a:ext>
-            </a:extLst>
-          </p:cNvPr>
-          <p:cNvSpPr>
-            <a:spLocks noGrp="1"/>
-          </p:cNvSpPr>
-          <p:nvPr>
-            <p:ph idx="1"/>
-          </p:nvPr>
-        </p:nvSpPr>
-        <p:spPr/>
-        <p:txBody>
-          <a:bodyPr/>
-          <a:lstStyle/>
-          <a:p>
-            <a:r>
-              <a:rPr lang="en-US" dirty="0">
-                <a:highlight>
-                  <a:srgbClr val="FFFF00"/>
-                </a:highlight>
-              </a:rPr>
-              <a:t>Use machine learning models to predict the future (what will happen?)</a:t>
-            </a:r>
-          </a:p>
-          <a:p>
-            <a:r>
-              <a:rPr lang="en-US" dirty="0">
-                <a:highlight>
-                  <a:srgbClr val="FFFF00"/>
-                </a:highlight>
-              </a:rPr>
-              <a:t>Include KNIME workflow (screenshots) </a:t>
-            </a:r>
-          </a:p>
-          <a:p>
-            <a:r>
-              <a:rPr lang="en-US" dirty="0">
-                <a:highlight>
-                  <a:srgbClr val="FFFF00"/>
-                </a:highlight>
-              </a:rPr>
-              <a:t>Compare ML results</a:t>
-            </a:r>
-          </a:p>
-          <a:p>
-            <a:r>
-              <a:rPr lang="en-US" dirty="0">
-                <a:highlight>
-                  <a:srgbClr val="FFFF00"/>
-                </a:highlight>
-              </a:rPr>
-              <a:t>Evaluate results</a:t>
-            </a:r>
-          </a:p>
-          <a:p>
-            <a:r>
-              <a:rPr lang="en-US" dirty="0">
-                <a:highlight>
-                  <a:srgbClr val="FFFF00"/>
-                </a:highlight>
-              </a:rPr>
-              <a:t>Add slides as you want </a:t>
-            </a:r>
-          </a:p>
-          <a:p>
-            <a:endParaRPr lang="en-US" dirty="0">
-              <a:highlight>
-                <a:srgbClr val="FFFF00"/>
-              </a:highlight>
-            </a:endParaRPr>
-          </a:p>
-          <a:p>
-            <a:endParaRPr lang="en-US" dirty="0">
-              <a:highlight>
-                <a:srgbClr val="FFFF00"/>
-              </a:highlight>
-            </a:endParaRPr>
-          </a:p>
-          <a:p>
-            <a:endParaRPr lang="en-US" dirty="0">
-              <a:highlight>
-                <a:srgbClr val="FFFF00"/>
-              </a:highlight>
-            </a:endParaRPr>
+              <a:t>Data Visualization – Find Correlation </a:t>
+            </a:r>
           </a:p>
         </p:txBody>
       </p:sp>
@@ -4329,7 +4274,7 @@
           <p:cNvPr id="4" name="Slide Number Placeholder 3">
             <a:extLst>
               <a:ext uri="{FF2B5EF4-FFF2-40B4-BE49-F238E27FC236}">
-                <a16:creationId xmlns:a16="http://schemas.microsoft.com/office/drawing/2014/main" id="{FE2DD13F-F14E-DE22-68E3-8E5ADD79F467}"/>
+                <a16:creationId xmlns:a16="http://schemas.microsoft.com/office/drawing/2014/main" id="{AB66E3E2-AAD8-F512-2126-60AF9A4F7C65}"/>
               </a:ext>
             </a:extLst>
           </p:cNvPr>
@@ -4353,10 +4298,45 @@
           </a:p>
         </p:txBody>
       </p:sp>
+      <p:pic>
+        <p:nvPicPr>
+          <p:cNvPr id="8" name="Content Placeholder 7">
+            <a:extLst>
+              <a:ext uri="{FF2B5EF4-FFF2-40B4-BE49-F238E27FC236}">
+                <a16:creationId xmlns:a16="http://schemas.microsoft.com/office/drawing/2014/main" id="{7B631F5D-7090-7761-9F2D-247F856F57CE}"/>
+              </a:ext>
+            </a:extLst>
+          </p:cNvPr>
+          <p:cNvPicPr>
+            <a:picLocks noGrp="1" noChangeAspect="1"/>
+          </p:cNvPicPr>
+          <p:nvPr>
+            <p:ph idx="1"/>
+          </p:nvPr>
+        </p:nvPicPr>
+        <p:blipFill>
+          <a:blip r:embed="rId2">
+            <a:extLst>
+              <a:ext uri="{28A0092B-C50C-407E-A947-70E740481C1C}">
+                <a14:useLocalDpi xmlns:a14="http://schemas.microsoft.com/office/drawing/2010/main" val="0"/>
+              </a:ext>
+            </a:extLst>
+          </a:blip>
+          <a:stretch>
+            <a:fillRect/>
+          </a:stretch>
+        </p:blipFill>
+        <p:spPr>
+          <a:xfrm>
+            <a:off x="2442351" y="1519984"/>
+            <a:ext cx="7307298" cy="4836366"/>
+          </a:xfrm>
+        </p:spPr>
+      </p:pic>
     </p:spTree>
     <p:extLst>
       <p:ext uri="{BB962C8B-B14F-4D97-AF65-F5344CB8AC3E}">
-        <p14:creationId xmlns:p14="http://schemas.microsoft.com/office/powerpoint/2010/main" val="3821526636"/>
+        <p14:creationId xmlns:p14="http://schemas.microsoft.com/office/powerpoint/2010/main" val="2189497665"/>
       </p:ext>
     </p:extLst>
   </p:cSld>
@@ -4388,7 +4368,7 @@
           <p:cNvPr id="2" name="Title 1">
             <a:extLst>
               <a:ext uri="{FF2B5EF4-FFF2-40B4-BE49-F238E27FC236}">
-                <a16:creationId xmlns:a16="http://schemas.microsoft.com/office/drawing/2014/main" id="{BD813C4F-E389-0FC5-5E77-33D1D27B4D3B}"/>
+                <a16:creationId xmlns:a16="http://schemas.microsoft.com/office/drawing/2014/main" id="{CC460DD9-D622-39DA-AEFF-C63F7FD57B44}"/>
               </a:ext>
             </a:extLst>
           </p:cNvPr>
@@ -4406,59 +4386,52 @@
           <a:p>
             <a:r>
               <a:rPr lang="en-US" dirty="0"/>
-              <a:t>Conclusions </a:t>
-            </a:r>
-          </a:p>
-        </p:txBody>
-      </p:sp>
-      <p:sp>
-        <p:nvSpPr>
-          <p:cNvPr id="3" name="Content Placeholder 2">
-            <a:extLst>
-              <a:ext uri="{FF2B5EF4-FFF2-40B4-BE49-F238E27FC236}">
-                <a16:creationId xmlns:a16="http://schemas.microsoft.com/office/drawing/2014/main" id="{CAFBCEF9-C35F-5DCA-D60C-DF469FFEC4A4}"/>
-              </a:ext>
-            </a:extLst>
-          </p:cNvPr>
-          <p:cNvSpPr>
-            <a:spLocks noGrp="1"/>
-          </p:cNvSpPr>
+              <a:t>Data Visualization – Scatter Plot</a:t>
+            </a:r>
+          </a:p>
+        </p:txBody>
+      </p:sp>
+      <p:pic>
+        <p:nvPicPr>
+          <p:cNvPr id="6" name="Content Placeholder 5">
+            <a:extLst>
+              <a:ext uri="{FF2B5EF4-FFF2-40B4-BE49-F238E27FC236}">
+                <a16:creationId xmlns:a16="http://schemas.microsoft.com/office/drawing/2014/main" id="{615C0B36-4B05-CAA3-D218-AA866301554E}"/>
+              </a:ext>
+            </a:extLst>
+          </p:cNvPr>
+          <p:cNvPicPr>
+            <a:picLocks noGrp="1" noChangeAspect="1"/>
+          </p:cNvPicPr>
           <p:nvPr>
             <p:ph idx="1"/>
           </p:nvPr>
-        </p:nvSpPr>
-        <p:spPr/>
-        <p:txBody>
-          <a:bodyPr/>
-          <a:lstStyle/>
-          <a:p>
-            <a:r>
-              <a:rPr lang="en-US" dirty="0">
-                <a:highlight>
-                  <a:srgbClr val="FFFF00"/>
-                </a:highlight>
-              </a:rPr>
-              <a:t>Summarize your conclusions </a:t>
-            </a:r>
-          </a:p>
-          <a:p>
-            <a:r>
-              <a:rPr lang="en-US" dirty="0">
-                <a:highlight>
-                  <a:srgbClr val="FFFF00"/>
-                </a:highlight>
-              </a:rPr>
-              <a:t>Only one slide </a:t>
-            </a:r>
-          </a:p>
-        </p:txBody>
-      </p:sp>
+        </p:nvPicPr>
+        <p:blipFill>
+          <a:blip r:embed="rId2">
+            <a:extLst>
+              <a:ext uri="{28A0092B-C50C-407E-A947-70E740481C1C}">
+                <a14:useLocalDpi xmlns:a14="http://schemas.microsoft.com/office/drawing/2010/main" val="0"/>
+              </a:ext>
+            </a:extLst>
+          </a:blip>
+          <a:stretch>
+            <a:fillRect/>
+          </a:stretch>
+        </p:blipFill>
+        <p:spPr>
+          <a:xfrm>
+            <a:off x="3706874" y="1489204"/>
+            <a:ext cx="4778252" cy="4731222"/>
+          </a:xfrm>
+        </p:spPr>
+      </p:pic>
       <p:sp>
         <p:nvSpPr>
           <p:cNvPr id="4" name="Slide Number Placeholder 3">
             <a:extLst>
               <a:ext uri="{FF2B5EF4-FFF2-40B4-BE49-F238E27FC236}">
-                <a16:creationId xmlns:a16="http://schemas.microsoft.com/office/drawing/2014/main" id="{9DB16714-064C-5A95-F5A4-61CE61A414AD}"/>
+                <a16:creationId xmlns:a16="http://schemas.microsoft.com/office/drawing/2014/main" id="{8888256C-E6A8-005A-01E5-40DA1592C0BF}"/>
               </a:ext>
             </a:extLst>
           </p:cNvPr>
@@ -4485,7 +4458,7 @@
     </p:spTree>
     <p:extLst>
       <p:ext uri="{BB962C8B-B14F-4D97-AF65-F5344CB8AC3E}">
-        <p14:creationId xmlns:p14="http://schemas.microsoft.com/office/powerpoint/2010/main" val="4147814722"/>
+        <p14:creationId xmlns:p14="http://schemas.microsoft.com/office/powerpoint/2010/main" val="2057214175"/>
       </p:ext>
     </p:extLst>
   </p:cSld>
@@ -4517,7 +4490,7 @@
           <p:cNvPr id="2" name="Title 1">
             <a:extLst>
               <a:ext uri="{FF2B5EF4-FFF2-40B4-BE49-F238E27FC236}">
-                <a16:creationId xmlns:a16="http://schemas.microsoft.com/office/drawing/2014/main" id="{CE4FC326-77E1-7C58-067E-4C0493CD0A8D}"/>
+                <a16:creationId xmlns:a16="http://schemas.microsoft.com/office/drawing/2014/main" id="{CC460DD9-D622-39DA-AEFF-C63F7FD57B44}"/>
               </a:ext>
             </a:extLst>
           </p:cNvPr>
@@ -4528,41 +4501,24 @@
             <p:ph type="title"/>
           </p:nvPr>
         </p:nvSpPr>
-        <p:spPr>
-          <a:xfrm>
-            <a:off x="3541552" y="1157681"/>
-            <a:ext cx="3614257" cy="4538444"/>
-          </a:xfrm>
-        </p:spPr>
-        <p:txBody>
-          <a:bodyPr>
-            <a:noAutofit/>
-          </a:bodyPr>
-          <a:lstStyle/>
-          <a:p>
-            <a:r>
-              <a:rPr lang="en-US" sz="33600" dirty="0">
-                <a:solidFill>
-                  <a:srgbClr val="7030A0"/>
-                </a:solidFill>
-                <a:sym typeface="Wingdings" panose="05000000000000000000" pitchFamily="2" charset="2"/>
-              </a:rPr>
-              <a:t> </a:t>
-            </a:r>
-            <a:endParaRPr lang="en-US" sz="33600" dirty="0">
-              <a:solidFill>
-                <a:srgbClr val="7030A0"/>
-              </a:solidFill>
-            </a:endParaRPr>
-          </a:p>
-        </p:txBody>
-      </p:sp>
-      <p:sp>
-        <p:nvSpPr>
-          <p:cNvPr id="3" name="Slide Number Placeholder 2">
-            <a:extLst>
-              <a:ext uri="{FF2B5EF4-FFF2-40B4-BE49-F238E27FC236}">
-                <a16:creationId xmlns:a16="http://schemas.microsoft.com/office/drawing/2014/main" id="{14A2F5BC-4D35-7AE1-609A-9916E337CD69}"/>
+        <p:spPr/>
+        <p:txBody>
+          <a:bodyPr/>
+          <a:lstStyle/>
+          <a:p>
+            <a:r>
+              <a:rPr lang="en-US" dirty="0"/>
+              <a:t>Data Visualization – Box Plot</a:t>
+            </a:r>
+          </a:p>
+        </p:txBody>
+      </p:sp>
+      <p:sp>
+        <p:nvSpPr>
+          <p:cNvPr id="4" name="Slide Number Placeholder 3">
+            <a:extLst>
+              <a:ext uri="{FF2B5EF4-FFF2-40B4-BE49-F238E27FC236}">
+                <a16:creationId xmlns:a16="http://schemas.microsoft.com/office/drawing/2014/main" id="{8888256C-E6A8-005A-01E5-40DA1592C0BF}"/>
               </a:ext>
             </a:extLst>
           </p:cNvPr>
@@ -4586,10 +4542,525 @@
           </a:p>
         </p:txBody>
       </p:sp>
+      <p:pic>
+        <p:nvPicPr>
+          <p:cNvPr id="8" name="Content Placeholder 7">
+            <a:extLst>
+              <a:ext uri="{FF2B5EF4-FFF2-40B4-BE49-F238E27FC236}">
+                <a16:creationId xmlns:a16="http://schemas.microsoft.com/office/drawing/2014/main" id="{E964022B-3328-B285-D09F-013012B6F695}"/>
+              </a:ext>
+            </a:extLst>
+          </p:cNvPr>
+          <p:cNvPicPr>
+            <a:picLocks noGrp="1" noChangeAspect="1"/>
+          </p:cNvPicPr>
+          <p:nvPr>
+            <p:ph idx="1"/>
+          </p:nvPr>
+        </p:nvPicPr>
+        <p:blipFill>
+          <a:blip r:embed="rId2">
+            <a:extLst>
+              <a:ext uri="{28A0092B-C50C-407E-A947-70E740481C1C}">
+                <a14:useLocalDpi xmlns:a14="http://schemas.microsoft.com/office/drawing/2010/main" val="0"/>
+              </a:ext>
+            </a:extLst>
+          </a:blip>
+          <a:stretch>
+            <a:fillRect/>
+          </a:stretch>
+        </p:blipFill>
+        <p:spPr>
+          <a:xfrm>
+            <a:off x="3587139" y="1402257"/>
+            <a:ext cx="5023461" cy="4799420"/>
+          </a:xfrm>
+        </p:spPr>
+      </p:pic>
     </p:spTree>
     <p:extLst>
       <p:ext uri="{BB962C8B-B14F-4D97-AF65-F5344CB8AC3E}">
-        <p14:creationId xmlns:p14="http://schemas.microsoft.com/office/powerpoint/2010/main" val="1496494060"/>
+        <p14:creationId xmlns:p14="http://schemas.microsoft.com/office/powerpoint/2010/main" val="4033329000"/>
+      </p:ext>
+    </p:extLst>
+  </p:cSld>
+  <p:clrMapOvr>
+    <a:masterClrMapping/>
+  </p:clrMapOvr>
+</p:sld>
+</file>
+
+<file path=ppt/slides/slide16.xml><?xml version="1.0" encoding="utf-8"?>
+<p:sld xmlns:a="http://schemas.openxmlformats.org/drawingml/2006/main" xmlns:r="http://schemas.openxmlformats.org/officeDocument/2006/relationships" xmlns:p="http://schemas.openxmlformats.org/presentationml/2006/main">
+  <p:cSld>
+    <p:spTree>
+      <p:nvGrpSpPr>
+        <p:cNvPr id="1" name=""/>
+        <p:cNvGrpSpPr/>
+        <p:nvPr/>
+      </p:nvGrpSpPr>
+      <p:grpSpPr>
+        <a:xfrm>
+          <a:off x="0" y="0"/>
+          <a:ext cx="0" cy="0"/>
+          <a:chOff x="0" y="0"/>
+          <a:chExt cx="0" cy="0"/>
+        </a:xfrm>
+      </p:grpSpPr>
+      <p:sp>
+        <p:nvSpPr>
+          <p:cNvPr id="4" name="Title 3">
+            <a:extLst>
+              <a:ext uri="{FF2B5EF4-FFF2-40B4-BE49-F238E27FC236}">
+                <a16:creationId xmlns:a16="http://schemas.microsoft.com/office/drawing/2014/main" id="{A8348381-F94E-1E08-559A-B780DCA65C20}"/>
+              </a:ext>
+            </a:extLst>
+          </p:cNvPr>
+          <p:cNvSpPr>
+            <a:spLocks noGrp="1"/>
+          </p:cNvSpPr>
+          <p:nvPr>
+            <p:ph type="title"/>
+          </p:nvPr>
+        </p:nvSpPr>
+        <p:spPr/>
+        <p:txBody>
+          <a:bodyPr/>
+          <a:lstStyle/>
+          <a:p>
+            <a:r>
+              <a:rPr lang="en-US" dirty="0"/>
+              <a:t>Data Preparation </a:t>
+            </a:r>
+          </a:p>
+        </p:txBody>
+      </p:sp>
+      <p:sp>
+        <p:nvSpPr>
+          <p:cNvPr id="2" name="Slide Number Placeholder 1">
+            <a:extLst>
+              <a:ext uri="{FF2B5EF4-FFF2-40B4-BE49-F238E27FC236}">
+                <a16:creationId xmlns:a16="http://schemas.microsoft.com/office/drawing/2014/main" id="{B846FC3F-E470-CBDC-61DA-F54A1F4524F3}"/>
+              </a:ext>
+            </a:extLst>
+          </p:cNvPr>
+          <p:cNvSpPr>
+            <a:spLocks noGrp="1"/>
+          </p:cNvSpPr>
+          <p:nvPr>
+            <p:ph type="sldNum" sz="quarter" idx="12"/>
+          </p:nvPr>
+        </p:nvSpPr>
+        <p:spPr/>
+        <p:txBody>
+          <a:bodyPr/>
+          <a:lstStyle/>
+          <a:p>
+            <a:fld id="{F56AC8B8-03BA-4745-994C-072AEE7EB195}" type="slidenum">
+              <a:rPr lang="en-US" smtClean="0"/>
+              <a:t>16</a:t>
+            </a:fld>
+            <a:endParaRPr lang="en-US"/>
+          </a:p>
+        </p:txBody>
+      </p:sp>
+    </p:spTree>
+    <p:extLst>
+      <p:ext uri="{BB962C8B-B14F-4D97-AF65-F5344CB8AC3E}">
+        <p14:creationId xmlns:p14="http://schemas.microsoft.com/office/powerpoint/2010/main" val="4055406362"/>
+      </p:ext>
+    </p:extLst>
+  </p:cSld>
+  <p:clrMapOvr>
+    <a:masterClrMapping/>
+  </p:clrMapOvr>
+</p:sld>
+</file>
+
+<file path=ppt/slides/slide17.xml><?xml version="1.0" encoding="utf-8"?>
+<p:sld xmlns:a="http://schemas.openxmlformats.org/drawingml/2006/main" xmlns:r="http://schemas.openxmlformats.org/officeDocument/2006/relationships" xmlns:p="http://schemas.openxmlformats.org/presentationml/2006/main">
+  <p:cSld>
+    <p:spTree>
+      <p:nvGrpSpPr>
+        <p:cNvPr id="1" name=""/>
+        <p:cNvGrpSpPr/>
+        <p:nvPr/>
+      </p:nvGrpSpPr>
+      <p:grpSpPr>
+        <a:xfrm>
+          <a:off x="0" y="0"/>
+          <a:ext cx="0" cy="0"/>
+          <a:chOff x="0" y="0"/>
+          <a:chExt cx="0" cy="0"/>
+        </a:xfrm>
+      </p:grpSpPr>
+      <p:sp>
+        <p:nvSpPr>
+          <p:cNvPr id="2" name="Title 1">
+            <a:extLst>
+              <a:ext uri="{FF2B5EF4-FFF2-40B4-BE49-F238E27FC236}">
+                <a16:creationId xmlns:a16="http://schemas.microsoft.com/office/drawing/2014/main" id="{A9C1B35F-3701-6290-02D6-ACEB707911E9}"/>
+              </a:ext>
+            </a:extLst>
+          </p:cNvPr>
+          <p:cNvSpPr>
+            <a:spLocks noGrp="1"/>
+          </p:cNvSpPr>
+          <p:nvPr>
+            <p:ph type="title"/>
+          </p:nvPr>
+        </p:nvSpPr>
+        <p:spPr/>
+        <p:txBody>
+          <a:bodyPr/>
+          <a:lstStyle/>
+          <a:p>
+            <a:r>
+              <a:rPr lang="en-US" dirty="0"/>
+              <a:t>Data Preparation – Data Cleaning</a:t>
+            </a:r>
+          </a:p>
+        </p:txBody>
+      </p:sp>
+      <p:sp>
+        <p:nvSpPr>
+          <p:cNvPr id="3" name="Content Placeholder 2">
+            <a:extLst>
+              <a:ext uri="{FF2B5EF4-FFF2-40B4-BE49-F238E27FC236}">
+                <a16:creationId xmlns:a16="http://schemas.microsoft.com/office/drawing/2014/main" id="{3E7C0F92-F4D1-4D1D-E6F0-2FC50E2E2349}"/>
+              </a:ext>
+            </a:extLst>
+          </p:cNvPr>
+          <p:cNvSpPr>
+            <a:spLocks noGrp="1"/>
+          </p:cNvSpPr>
+          <p:nvPr>
+            <p:ph idx="1"/>
+          </p:nvPr>
+        </p:nvSpPr>
+        <p:spPr/>
+        <p:txBody>
+          <a:bodyPr/>
+          <a:lstStyle/>
+          <a:p>
+            <a:r>
+              <a:rPr lang="en-US" dirty="0"/>
+              <a:t>We clean the data by doing some operations like:</a:t>
+            </a:r>
+          </a:p>
+          <a:p>
+            <a:pPr lvl="1"/>
+            <a:r>
+              <a:rPr lang="en-US" dirty="0"/>
+              <a:t>Dropping the column f_23 since it does not affect the data as we saw previously in the heat map.</a:t>
+            </a:r>
+          </a:p>
+          <a:p>
+            <a:pPr lvl="1"/>
+            <a:r>
+              <a:rPr lang="en-US" dirty="0"/>
+              <a:t>Data Augmentation to generate more data because our data set was imbalanced and the majority of our data is ZERO which represents the Non-Spill class.</a:t>
+            </a:r>
+          </a:p>
+          <a:p>
+            <a:pPr lvl="1"/>
+            <a:r>
+              <a:rPr lang="en-US" dirty="0"/>
+              <a:t>Since we do not have any missing values in any column in our data set, we don’t have to clean the data from this perspective.</a:t>
+            </a:r>
+          </a:p>
+          <a:p>
+            <a:pPr lvl="1"/>
+            <a:endParaRPr lang="en-US" dirty="0"/>
+          </a:p>
+        </p:txBody>
+      </p:sp>
+      <p:sp>
+        <p:nvSpPr>
+          <p:cNvPr id="4" name="Slide Number Placeholder 3">
+            <a:extLst>
+              <a:ext uri="{FF2B5EF4-FFF2-40B4-BE49-F238E27FC236}">
+                <a16:creationId xmlns:a16="http://schemas.microsoft.com/office/drawing/2014/main" id="{077E4126-A5A7-FE95-732D-C3DF921BF6C9}"/>
+              </a:ext>
+            </a:extLst>
+          </p:cNvPr>
+          <p:cNvSpPr>
+            <a:spLocks noGrp="1"/>
+          </p:cNvSpPr>
+          <p:nvPr>
+            <p:ph type="sldNum" sz="quarter" idx="12"/>
+          </p:nvPr>
+        </p:nvSpPr>
+        <p:spPr/>
+        <p:txBody>
+          <a:bodyPr/>
+          <a:lstStyle/>
+          <a:p>
+            <a:fld id="{F56AC8B8-03BA-4745-994C-072AEE7EB195}" type="slidenum">
+              <a:rPr lang="en-US" smtClean="0"/>
+              <a:t>17</a:t>
+            </a:fld>
+            <a:endParaRPr lang="en-US"/>
+          </a:p>
+        </p:txBody>
+      </p:sp>
+    </p:spTree>
+    <p:extLst>
+      <p:ext uri="{BB962C8B-B14F-4D97-AF65-F5344CB8AC3E}">
+        <p14:creationId xmlns:p14="http://schemas.microsoft.com/office/powerpoint/2010/main" val="2083954083"/>
+      </p:ext>
+    </p:extLst>
+  </p:cSld>
+  <p:clrMapOvr>
+    <a:masterClrMapping/>
+  </p:clrMapOvr>
+</p:sld>
+</file>
+
+<file path=ppt/slides/slide18.xml><?xml version="1.0" encoding="utf-8"?>
+<p:sld xmlns:a="http://schemas.openxmlformats.org/drawingml/2006/main" xmlns:r="http://schemas.openxmlformats.org/officeDocument/2006/relationships" xmlns:p="http://schemas.openxmlformats.org/presentationml/2006/main">
+  <p:cSld>
+    <p:spTree>
+      <p:nvGrpSpPr>
+        <p:cNvPr id="1" name=""/>
+        <p:cNvGrpSpPr/>
+        <p:nvPr/>
+      </p:nvGrpSpPr>
+      <p:grpSpPr>
+        <a:xfrm>
+          <a:off x="0" y="0"/>
+          <a:ext cx="0" cy="0"/>
+          <a:chOff x="0" y="0"/>
+          <a:chExt cx="0" cy="0"/>
+        </a:xfrm>
+      </p:grpSpPr>
+      <p:sp>
+        <p:nvSpPr>
+          <p:cNvPr id="2" name="Title 1">
+            <a:extLst>
+              <a:ext uri="{FF2B5EF4-FFF2-40B4-BE49-F238E27FC236}">
+                <a16:creationId xmlns:a16="http://schemas.microsoft.com/office/drawing/2014/main" id="{141BE03E-D893-5E74-0896-9F37BB53B52A}"/>
+              </a:ext>
+            </a:extLst>
+          </p:cNvPr>
+          <p:cNvSpPr>
+            <a:spLocks noGrp="1"/>
+          </p:cNvSpPr>
+          <p:nvPr>
+            <p:ph type="title"/>
+          </p:nvPr>
+        </p:nvSpPr>
+        <p:spPr/>
+        <p:txBody>
+          <a:bodyPr/>
+          <a:lstStyle/>
+          <a:p>
+            <a:r>
+              <a:rPr lang="en-US" dirty="0"/>
+              <a:t>Data Cleaning</a:t>
+            </a:r>
+          </a:p>
+        </p:txBody>
+      </p:sp>
+      <p:pic>
+        <p:nvPicPr>
+          <p:cNvPr id="6" name="Content Placeholder 5">
+            <a:extLst>
+              <a:ext uri="{FF2B5EF4-FFF2-40B4-BE49-F238E27FC236}">
+                <a16:creationId xmlns:a16="http://schemas.microsoft.com/office/drawing/2014/main" id="{E8085B72-832C-A781-71B4-97EDAD61D6F7}"/>
+              </a:ext>
+            </a:extLst>
+          </p:cNvPr>
+          <p:cNvPicPr>
+            <a:picLocks noGrp="1" noChangeAspect="1"/>
+          </p:cNvPicPr>
+          <p:nvPr>
+            <p:ph idx="1"/>
+          </p:nvPr>
+        </p:nvPicPr>
+        <p:blipFill>
+          <a:blip r:embed="rId2">
+            <a:extLst>
+              <a:ext uri="{28A0092B-C50C-407E-A947-70E740481C1C}">
+                <a14:useLocalDpi xmlns:a14="http://schemas.microsoft.com/office/drawing/2010/main" val="0"/>
+              </a:ext>
+            </a:extLst>
+          </a:blip>
+          <a:stretch>
+            <a:fillRect/>
+          </a:stretch>
+        </p:blipFill>
+        <p:spPr>
+          <a:xfrm>
+            <a:off x="2808606" y="2162433"/>
+            <a:ext cx="6574787" cy="2719012"/>
+          </a:xfrm>
+        </p:spPr>
+      </p:pic>
+      <p:sp>
+        <p:nvSpPr>
+          <p:cNvPr id="4" name="Slide Number Placeholder 3">
+            <a:extLst>
+              <a:ext uri="{FF2B5EF4-FFF2-40B4-BE49-F238E27FC236}">
+                <a16:creationId xmlns:a16="http://schemas.microsoft.com/office/drawing/2014/main" id="{1006D956-3D8C-F8B2-CE2A-9D43C6F8102D}"/>
+              </a:ext>
+            </a:extLst>
+          </p:cNvPr>
+          <p:cNvSpPr>
+            <a:spLocks noGrp="1"/>
+          </p:cNvSpPr>
+          <p:nvPr>
+            <p:ph type="sldNum" sz="quarter" idx="12"/>
+          </p:nvPr>
+        </p:nvSpPr>
+        <p:spPr/>
+        <p:txBody>
+          <a:bodyPr/>
+          <a:lstStyle/>
+          <a:p>
+            <a:fld id="{F56AC8B8-03BA-4745-994C-072AEE7EB195}" type="slidenum">
+              <a:rPr lang="en-US" smtClean="0"/>
+              <a:t>18</a:t>
+            </a:fld>
+            <a:endParaRPr lang="en-US"/>
+          </a:p>
+        </p:txBody>
+      </p:sp>
+    </p:spTree>
+    <p:extLst>
+      <p:ext uri="{BB962C8B-B14F-4D97-AF65-F5344CB8AC3E}">
+        <p14:creationId xmlns:p14="http://schemas.microsoft.com/office/powerpoint/2010/main" val="1831439304"/>
+      </p:ext>
+    </p:extLst>
+  </p:cSld>
+  <p:clrMapOvr>
+    <a:masterClrMapping/>
+  </p:clrMapOvr>
+</p:sld>
+</file>
+
+<file path=ppt/slides/slide19.xml><?xml version="1.0" encoding="utf-8"?>
+<p:sld xmlns:a="http://schemas.openxmlformats.org/drawingml/2006/main" xmlns:r="http://schemas.openxmlformats.org/officeDocument/2006/relationships" xmlns:p="http://schemas.openxmlformats.org/presentationml/2006/main">
+  <p:cSld>
+    <p:spTree>
+      <p:nvGrpSpPr>
+        <p:cNvPr id="1" name=""/>
+        <p:cNvGrpSpPr/>
+        <p:nvPr/>
+      </p:nvGrpSpPr>
+      <p:grpSpPr>
+        <a:xfrm>
+          <a:off x="0" y="0"/>
+          <a:ext cx="0" cy="0"/>
+          <a:chOff x="0" y="0"/>
+          <a:chExt cx="0" cy="0"/>
+        </a:xfrm>
+      </p:grpSpPr>
+      <p:sp>
+        <p:nvSpPr>
+          <p:cNvPr id="2" name="Title 1">
+            <a:extLst>
+              <a:ext uri="{FF2B5EF4-FFF2-40B4-BE49-F238E27FC236}">
+                <a16:creationId xmlns:a16="http://schemas.microsoft.com/office/drawing/2014/main" id="{A9C1B35F-3701-6290-02D6-ACEB707911E9}"/>
+              </a:ext>
+            </a:extLst>
+          </p:cNvPr>
+          <p:cNvSpPr>
+            <a:spLocks noGrp="1"/>
+          </p:cNvSpPr>
+          <p:nvPr>
+            <p:ph type="title"/>
+          </p:nvPr>
+        </p:nvSpPr>
+        <p:spPr/>
+        <p:txBody>
+          <a:bodyPr/>
+          <a:lstStyle/>
+          <a:p>
+            <a:r>
+              <a:rPr lang="en-US" dirty="0"/>
+              <a:t>Data Preparation – Data Transformation</a:t>
+            </a:r>
+          </a:p>
+        </p:txBody>
+      </p:sp>
+      <p:sp>
+        <p:nvSpPr>
+          <p:cNvPr id="3" name="Content Placeholder 2">
+            <a:extLst>
+              <a:ext uri="{FF2B5EF4-FFF2-40B4-BE49-F238E27FC236}">
+                <a16:creationId xmlns:a16="http://schemas.microsoft.com/office/drawing/2014/main" id="{3E7C0F92-F4D1-4D1D-E6F0-2FC50E2E2349}"/>
+              </a:ext>
+            </a:extLst>
+          </p:cNvPr>
+          <p:cNvSpPr>
+            <a:spLocks noGrp="1"/>
+          </p:cNvSpPr>
+          <p:nvPr>
+            <p:ph idx="1"/>
+          </p:nvPr>
+        </p:nvSpPr>
+        <p:spPr/>
+        <p:txBody>
+          <a:bodyPr>
+            <a:normAutofit/>
+          </a:bodyPr>
+          <a:lstStyle/>
+          <a:p>
+            <a:r>
+              <a:rPr lang="en-US" dirty="0"/>
+              <a:t>We apply data transformation by scaling all attributes to make all columns have the same range which is “between 0 and 1”.</a:t>
+            </a:r>
+          </a:p>
+          <a:p>
+            <a:r>
+              <a:rPr lang="en-US" dirty="0"/>
+              <a:t>As the scaled data frame in the next slide shows that the features `F` are scaled by `</a:t>
+            </a:r>
+            <a:r>
+              <a:rPr lang="en-US" dirty="0" err="1"/>
+              <a:t>StandardScaler</a:t>
+            </a:r>
+            <a:r>
+              <a:rPr lang="en-US" dirty="0"/>
+              <a:t>` which means scaling each feature to mean 0 and standard deviation 1. </a:t>
+            </a:r>
+          </a:p>
+        </p:txBody>
+      </p:sp>
+      <p:sp>
+        <p:nvSpPr>
+          <p:cNvPr id="4" name="Slide Number Placeholder 3">
+            <a:extLst>
+              <a:ext uri="{FF2B5EF4-FFF2-40B4-BE49-F238E27FC236}">
+                <a16:creationId xmlns:a16="http://schemas.microsoft.com/office/drawing/2014/main" id="{077E4126-A5A7-FE95-732D-C3DF921BF6C9}"/>
+              </a:ext>
+            </a:extLst>
+          </p:cNvPr>
+          <p:cNvSpPr>
+            <a:spLocks noGrp="1"/>
+          </p:cNvSpPr>
+          <p:nvPr>
+            <p:ph type="sldNum" sz="quarter" idx="12"/>
+          </p:nvPr>
+        </p:nvSpPr>
+        <p:spPr/>
+        <p:txBody>
+          <a:bodyPr/>
+          <a:lstStyle/>
+          <a:p>
+            <a:fld id="{F56AC8B8-03BA-4745-994C-072AEE7EB195}" type="slidenum">
+              <a:rPr lang="en-US" smtClean="0"/>
+              <a:t>19</a:t>
+            </a:fld>
+            <a:endParaRPr lang="en-US"/>
+          </a:p>
+        </p:txBody>
+      </p:sp>
+    </p:spTree>
+    <p:extLst>
+      <p:ext uri="{BB962C8B-B14F-4D97-AF65-F5344CB8AC3E}">
+        <p14:creationId xmlns:p14="http://schemas.microsoft.com/office/powerpoint/2010/main" val="905990703"/>
       </p:ext>
     </p:extLst>
   </p:cSld>
@@ -4686,7 +5157,7 @@
 </p:sld>
 </file>
 
-<file path=ppt/slides/slide3.xml><?xml version="1.0" encoding="utf-8"?>
+<file path=ppt/slides/slide20.xml><?xml version="1.0" encoding="utf-8"?>
 <p:sld xmlns:a="http://schemas.openxmlformats.org/drawingml/2006/main" xmlns:r="http://schemas.openxmlformats.org/officeDocument/2006/relationships" xmlns:p="http://schemas.openxmlformats.org/presentationml/2006/main">
   <p:cSld>
     <p:spTree>
@@ -4708,7 +5179,7 @@
           <p:cNvPr id="2" name="Title 1">
             <a:extLst>
               <a:ext uri="{FF2B5EF4-FFF2-40B4-BE49-F238E27FC236}">
-                <a16:creationId xmlns:a16="http://schemas.microsoft.com/office/drawing/2014/main" id="{43EE6C72-03D5-F7F0-1189-4C7BA75BAA61}"/>
+                <a16:creationId xmlns:a16="http://schemas.microsoft.com/office/drawing/2014/main" id="{9AC1E471-DA64-AEA6-77CE-51F6971ABED8}"/>
               </a:ext>
             </a:extLst>
           </p:cNvPr>
@@ -4726,59 +5197,52 @@
           <a:p>
             <a:r>
               <a:rPr lang="en-US" dirty="0"/>
-              <a:t>About the domain</a:t>
-            </a:r>
-          </a:p>
-        </p:txBody>
-      </p:sp>
-      <p:sp>
-        <p:nvSpPr>
-          <p:cNvPr id="3" name="Content Placeholder 2">
-            <a:extLst>
-              <a:ext uri="{FF2B5EF4-FFF2-40B4-BE49-F238E27FC236}">
-                <a16:creationId xmlns:a16="http://schemas.microsoft.com/office/drawing/2014/main" id="{2CAC2674-75A1-6757-F8C2-5CD61FD6D8AE}"/>
-              </a:ext>
-            </a:extLst>
-          </p:cNvPr>
-          <p:cNvSpPr>
-            <a:spLocks noGrp="1"/>
-          </p:cNvSpPr>
+              <a:t>Data Transformation – Data Scaling</a:t>
+            </a:r>
+          </a:p>
+        </p:txBody>
+      </p:sp>
+      <p:pic>
+        <p:nvPicPr>
+          <p:cNvPr id="6" name="Content Placeholder 5">
+            <a:extLst>
+              <a:ext uri="{FF2B5EF4-FFF2-40B4-BE49-F238E27FC236}">
+                <a16:creationId xmlns:a16="http://schemas.microsoft.com/office/drawing/2014/main" id="{7BEDD611-92E0-E02E-92A0-C09A4B7BD575}"/>
+              </a:ext>
+            </a:extLst>
+          </p:cNvPr>
+          <p:cNvPicPr>
+            <a:picLocks noGrp="1" noChangeAspect="1"/>
+          </p:cNvPicPr>
           <p:nvPr>
             <p:ph idx="1"/>
           </p:nvPr>
-        </p:nvSpPr>
-        <p:spPr/>
-        <p:txBody>
-          <a:bodyPr/>
-          <a:lstStyle/>
-          <a:p>
-            <a:r>
-              <a:rPr lang="en-US" dirty="0">
-                <a:highlight>
-                  <a:srgbClr val="FFFF00"/>
-                </a:highlight>
-              </a:rPr>
-              <a:t>Describe the business domain of the dataset here</a:t>
-            </a:r>
-          </a:p>
-          <a:p>
-            <a:r>
-              <a:rPr lang="en-US" dirty="0">
-                <a:highlight>
-                  <a:srgbClr val="FFFF00"/>
-                </a:highlight>
-              </a:rPr>
-              <a:t>Add slides as you want </a:t>
-            </a:r>
-          </a:p>
-        </p:txBody>
-      </p:sp>
+        </p:nvPicPr>
+        <p:blipFill>
+          <a:blip r:embed="rId2">
+            <a:extLst>
+              <a:ext uri="{28A0092B-C50C-407E-A947-70E740481C1C}">
+                <a14:useLocalDpi xmlns:a14="http://schemas.microsoft.com/office/drawing/2010/main" val="0"/>
+              </a:ext>
+            </a:extLst>
+          </a:blip>
+          <a:stretch>
+            <a:fillRect/>
+          </a:stretch>
+        </p:blipFill>
+        <p:spPr>
+          <a:xfrm>
+            <a:off x="838200" y="1985110"/>
+            <a:ext cx="10515600" cy="4032367"/>
+          </a:xfrm>
+        </p:spPr>
+      </p:pic>
       <p:sp>
         <p:nvSpPr>
           <p:cNvPr id="4" name="Slide Number Placeholder 3">
             <a:extLst>
               <a:ext uri="{FF2B5EF4-FFF2-40B4-BE49-F238E27FC236}">
-                <a16:creationId xmlns:a16="http://schemas.microsoft.com/office/drawing/2014/main" id="{13D1065C-0B23-6D9D-4687-807AC2FDE565}"/>
+                <a16:creationId xmlns:a16="http://schemas.microsoft.com/office/drawing/2014/main" id="{702282BE-4E99-92FD-035B-80504C5ABC73}"/>
               </a:ext>
             </a:extLst>
           </p:cNvPr>
@@ -4796,7 +5260,7 @@
           <a:p>
             <a:fld id="{F56AC8B8-03BA-4745-994C-072AEE7EB195}" type="slidenum">
               <a:rPr lang="en-US" smtClean="0"/>
-              <a:t>3</a:t>
+              <a:t>20</a:t>
             </a:fld>
             <a:endParaRPr lang="en-US"/>
           </a:p>
@@ -4805,7 +5269,7 @@
     </p:spTree>
     <p:extLst>
       <p:ext uri="{BB962C8B-B14F-4D97-AF65-F5344CB8AC3E}">
-        <p14:creationId xmlns:p14="http://schemas.microsoft.com/office/powerpoint/2010/main" val="3756280653"/>
+        <p14:creationId xmlns:p14="http://schemas.microsoft.com/office/powerpoint/2010/main" val="856345987"/>
       </p:ext>
     </p:extLst>
   </p:cSld>
@@ -4815,7 +5279,7 @@
 </p:sld>
 </file>
 
-<file path=ppt/slides/slide4.xml><?xml version="1.0" encoding="utf-8"?>
+<file path=ppt/slides/slide21.xml><?xml version="1.0" encoding="utf-8"?>
 <p:sld xmlns:a="http://schemas.openxmlformats.org/drawingml/2006/main" xmlns:r="http://schemas.openxmlformats.org/officeDocument/2006/relationships" xmlns:p="http://schemas.openxmlformats.org/presentationml/2006/main">
   <p:cSld>
     <p:spTree>
@@ -4834,10 +5298,10 @@
       </p:grpSpPr>
       <p:sp>
         <p:nvSpPr>
-          <p:cNvPr id="4" name="Title 3">
-            <a:extLst>
-              <a:ext uri="{FF2B5EF4-FFF2-40B4-BE49-F238E27FC236}">
-                <a16:creationId xmlns:a16="http://schemas.microsoft.com/office/drawing/2014/main" id="{A8348381-F94E-1E08-559A-B780DCA65C20}"/>
+          <p:cNvPr id="2" name="Title 1">
+            <a:extLst>
+              <a:ext uri="{FF2B5EF4-FFF2-40B4-BE49-F238E27FC236}">
+                <a16:creationId xmlns:a16="http://schemas.microsoft.com/office/drawing/2014/main" id="{B463CC68-8B2F-C1BD-CA14-45DE6904CBF8}"/>
               </a:ext>
             </a:extLst>
           </p:cNvPr>
@@ -4855,17 +5319,45 @@
           <a:p>
             <a:r>
               <a:rPr lang="en-US" dirty="0"/>
-              <a:t>About the data</a:t>
-            </a:r>
-          </a:p>
-        </p:txBody>
-      </p:sp>
-      <p:sp>
-        <p:nvSpPr>
-          <p:cNvPr id="2" name="Slide Number Placeholder 1">
-            <a:extLst>
-              <a:ext uri="{FF2B5EF4-FFF2-40B4-BE49-F238E27FC236}">
-                <a16:creationId xmlns:a16="http://schemas.microsoft.com/office/drawing/2014/main" id="{4F854354-C68F-8668-4886-D18DE3290A70}"/>
+              <a:t>Data Preparation</a:t>
+            </a:r>
+          </a:p>
+        </p:txBody>
+      </p:sp>
+      <p:sp>
+        <p:nvSpPr>
+          <p:cNvPr id="3" name="Content Placeholder 2">
+            <a:extLst>
+              <a:ext uri="{FF2B5EF4-FFF2-40B4-BE49-F238E27FC236}">
+                <a16:creationId xmlns:a16="http://schemas.microsoft.com/office/drawing/2014/main" id="{0B262590-A542-A54D-FF96-283BF4FEA08E}"/>
+              </a:ext>
+            </a:extLst>
+          </p:cNvPr>
+          <p:cNvSpPr>
+            <a:spLocks noGrp="1"/>
+          </p:cNvSpPr>
+          <p:nvPr>
+            <p:ph idx="1"/>
+          </p:nvPr>
+        </p:nvSpPr>
+        <p:spPr/>
+        <p:txBody>
+          <a:bodyPr/>
+          <a:lstStyle/>
+          <a:p>
+            <a:r>
+              <a:rPr lang="en-US" dirty="0"/>
+              <a:t>Splitting the Data into Training and Testing parts.</a:t>
+            </a:r>
+          </a:p>
+        </p:txBody>
+      </p:sp>
+      <p:sp>
+        <p:nvSpPr>
+          <p:cNvPr id="4" name="Slide Number Placeholder 3">
+            <a:extLst>
+              <a:ext uri="{FF2B5EF4-FFF2-40B4-BE49-F238E27FC236}">
+                <a16:creationId xmlns:a16="http://schemas.microsoft.com/office/drawing/2014/main" id="{6C25BD81-1BE9-8251-A49C-0E778A17F5F3}"/>
               </a:ext>
             </a:extLst>
           </p:cNvPr>
@@ -4883,685 +5375,7 @@
           <a:p>
             <a:fld id="{F56AC8B8-03BA-4745-994C-072AEE7EB195}" type="slidenum">
               <a:rPr lang="en-US" smtClean="0"/>
-              <a:t>4</a:t>
-            </a:fld>
-            <a:endParaRPr lang="en-US"/>
-          </a:p>
-        </p:txBody>
-      </p:sp>
-    </p:spTree>
-    <p:extLst>
-      <p:ext uri="{BB962C8B-B14F-4D97-AF65-F5344CB8AC3E}">
-        <p14:creationId xmlns:p14="http://schemas.microsoft.com/office/powerpoint/2010/main" val="2898937329"/>
-      </p:ext>
-    </p:extLst>
-  </p:cSld>
-  <p:clrMapOvr>
-    <a:masterClrMapping/>
-  </p:clrMapOvr>
-</p:sld>
-</file>
-
-<file path=ppt/slides/slide5.xml><?xml version="1.0" encoding="utf-8"?>
-<p:sld xmlns:a="http://schemas.openxmlformats.org/drawingml/2006/main" xmlns:r="http://schemas.openxmlformats.org/officeDocument/2006/relationships" xmlns:p="http://schemas.openxmlformats.org/presentationml/2006/main">
-  <p:cSld>
-    <p:spTree>
-      <p:nvGrpSpPr>
-        <p:cNvPr id="1" name=""/>
-        <p:cNvGrpSpPr/>
-        <p:nvPr/>
-      </p:nvGrpSpPr>
-      <p:grpSpPr>
-        <a:xfrm>
-          <a:off x="0" y="0"/>
-          <a:ext cx="0" cy="0"/>
-          <a:chOff x="0" y="0"/>
-          <a:chExt cx="0" cy="0"/>
-        </a:xfrm>
-      </p:grpSpPr>
-      <p:sp>
-        <p:nvSpPr>
-          <p:cNvPr id="2" name="Title 1">
-            <a:extLst>
-              <a:ext uri="{FF2B5EF4-FFF2-40B4-BE49-F238E27FC236}">
-                <a16:creationId xmlns:a16="http://schemas.microsoft.com/office/drawing/2014/main" id="{43EE6C72-03D5-F7F0-1189-4C7BA75BAA61}"/>
-              </a:ext>
-            </a:extLst>
-          </p:cNvPr>
-          <p:cNvSpPr>
-            <a:spLocks noGrp="1"/>
-          </p:cNvSpPr>
-          <p:nvPr>
-            <p:ph type="title"/>
-          </p:nvPr>
-        </p:nvSpPr>
-        <p:spPr/>
-        <p:txBody>
-          <a:bodyPr/>
-          <a:lstStyle/>
-          <a:p>
-            <a:r>
-              <a:rPr lang="en-US" dirty="0"/>
-              <a:t>About the data</a:t>
-            </a:r>
-          </a:p>
-        </p:txBody>
-      </p:sp>
-      <p:sp>
-        <p:nvSpPr>
-          <p:cNvPr id="3" name="Content Placeholder 2">
-            <a:extLst>
-              <a:ext uri="{FF2B5EF4-FFF2-40B4-BE49-F238E27FC236}">
-                <a16:creationId xmlns:a16="http://schemas.microsoft.com/office/drawing/2014/main" id="{2CAC2674-75A1-6757-F8C2-5CD61FD6D8AE}"/>
-              </a:ext>
-            </a:extLst>
-          </p:cNvPr>
-          <p:cNvSpPr>
-            <a:spLocks noGrp="1"/>
-          </p:cNvSpPr>
-          <p:nvPr>
-            <p:ph idx="1"/>
-          </p:nvPr>
-        </p:nvSpPr>
-        <p:spPr/>
-        <p:txBody>
-          <a:bodyPr/>
-          <a:lstStyle/>
-          <a:p>
-            <a:r>
-              <a:rPr lang="en-US" dirty="0">
-                <a:highlight>
-                  <a:srgbClr val="FFFF00"/>
-                </a:highlight>
-              </a:rPr>
-              <a:t>Describe the dataset here (data source, </a:t>
-            </a:r>
-            <a:r>
-              <a:rPr lang="en-US">
-                <a:highlight>
-                  <a:srgbClr val="FFFF00"/>
-                </a:highlight>
-              </a:rPr>
-              <a:t>data context, ….) </a:t>
-            </a:r>
-            <a:endParaRPr lang="en-US" dirty="0">
-              <a:highlight>
-                <a:srgbClr val="FFFF00"/>
-              </a:highlight>
-            </a:endParaRPr>
-          </a:p>
-          <a:p>
-            <a:r>
-              <a:rPr lang="en-US" dirty="0">
-                <a:highlight>
-                  <a:srgbClr val="FFFF00"/>
-                </a:highlight>
-              </a:rPr>
-              <a:t>Add slides as you want </a:t>
-            </a:r>
-          </a:p>
-        </p:txBody>
-      </p:sp>
-      <p:sp>
-        <p:nvSpPr>
-          <p:cNvPr id="4" name="Slide Number Placeholder 3">
-            <a:extLst>
-              <a:ext uri="{FF2B5EF4-FFF2-40B4-BE49-F238E27FC236}">
-                <a16:creationId xmlns:a16="http://schemas.microsoft.com/office/drawing/2014/main" id="{9EE1467D-13A7-BE50-EBBE-B4FE6C9FB6BF}"/>
-              </a:ext>
-            </a:extLst>
-          </p:cNvPr>
-          <p:cNvSpPr>
-            <a:spLocks noGrp="1"/>
-          </p:cNvSpPr>
-          <p:nvPr>
-            <p:ph type="sldNum" sz="quarter" idx="12"/>
-          </p:nvPr>
-        </p:nvSpPr>
-        <p:spPr/>
-        <p:txBody>
-          <a:bodyPr/>
-          <a:lstStyle/>
-          <a:p>
-            <a:fld id="{F56AC8B8-03BA-4745-994C-072AEE7EB195}" type="slidenum">
-              <a:rPr lang="en-US" smtClean="0"/>
-              <a:t>5</a:t>
-            </a:fld>
-            <a:endParaRPr lang="en-US"/>
-          </a:p>
-        </p:txBody>
-      </p:sp>
-    </p:spTree>
-    <p:extLst>
-      <p:ext uri="{BB962C8B-B14F-4D97-AF65-F5344CB8AC3E}">
-        <p14:creationId xmlns:p14="http://schemas.microsoft.com/office/powerpoint/2010/main" val="1589616354"/>
-      </p:ext>
-    </p:extLst>
-  </p:cSld>
-  <p:clrMapOvr>
-    <a:masterClrMapping/>
-  </p:clrMapOvr>
-</p:sld>
-</file>
-
-<file path=ppt/slides/slide6.xml><?xml version="1.0" encoding="utf-8"?>
-<p:sld xmlns:a="http://schemas.openxmlformats.org/drawingml/2006/main" xmlns:r="http://schemas.openxmlformats.org/officeDocument/2006/relationships" xmlns:p="http://schemas.openxmlformats.org/presentationml/2006/main">
-  <p:cSld>
-    <p:spTree>
-      <p:nvGrpSpPr>
-        <p:cNvPr id="1" name=""/>
-        <p:cNvGrpSpPr/>
-        <p:nvPr/>
-      </p:nvGrpSpPr>
-      <p:grpSpPr>
-        <a:xfrm>
-          <a:off x="0" y="0"/>
-          <a:ext cx="0" cy="0"/>
-          <a:chOff x="0" y="0"/>
-          <a:chExt cx="0" cy="0"/>
-        </a:xfrm>
-      </p:grpSpPr>
-      <p:sp>
-        <p:nvSpPr>
-          <p:cNvPr id="4" name="Title 3">
-            <a:extLst>
-              <a:ext uri="{FF2B5EF4-FFF2-40B4-BE49-F238E27FC236}">
-                <a16:creationId xmlns:a16="http://schemas.microsoft.com/office/drawing/2014/main" id="{A8348381-F94E-1E08-559A-B780DCA65C20}"/>
-              </a:ext>
-            </a:extLst>
-          </p:cNvPr>
-          <p:cNvSpPr>
-            <a:spLocks noGrp="1"/>
-          </p:cNvSpPr>
-          <p:nvPr>
-            <p:ph type="title"/>
-          </p:nvPr>
-        </p:nvSpPr>
-        <p:spPr/>
-        <p:txBody>
-          <a:bodyPr/>
-          <a:lstStyle/>
-          <a:p>
-            <a:r>
-              <a:rPr lang="en-US" dirty="0"/>
-              <a:t>Data Exploration </a:t>
-            </a:r>
-          </a:p>
-        </p:txBody>
-      </p:sp>
-      <p:sp>
-        <p:nvSpPr>
-          <p:cNvPr id="2" name="Slide Number Placeholder 1">
-            <a:extLst>
-              <a:ext uri="{FF2B5EF4-FFF2-40B4-BE49-F238E27FC236}">
-                <a16:creationId xmlns:a16="http://schemas.microsoft.com/office/drawing/2014/main" id="{870EF095-C38D-D53A-343F-4F2C4877626D}"/>
-              </a:ext>
-            </a:extLst>
-          </p:cNvPr>
-          <p:cNvSpPr>
-            <a:spLocks noGrp="1"/>
-          </p:cNvSpPr>
-          <p:nvPr>
-            <p:ph type="sldNum" sz="quarter" idx="12"/>
-          </p:nvPr>
-        </p:nvSpPr>
-        <p:spPr/>
-        <p:txBody>
-          <a:bodyPr/>
-          <a:lstStyle/>
-          <a:p>
-            <a:fld id="{F56AC8B8-03BA-4745-994C-072AEE7EB195}" type="slidenum">
-              <a:rPr lang="en-US" smtClean="0"/>
-              <a:t>6</a:t>
-            </a:fld>
-            <a:endParaRPr lang="en-US"/>
-          </a:p>
-        </p:txBody>
-      </p:sp>
-    </p:spTree>
-    <p:extLst>
-      <p:ext uri="{BB962C8B-B14F-4D97-AF65-F5344CB8AC3E}">
-        <p14:creationId xmlns:p14="http://schemas.microsoft.com/office/powerpoint/2010/main" val="2646417190"/>
-      </p:ext>
-    </p:extLst>
-  </p:cSld>
-  <p:clrMapOvr>
-    <a:masterClrMapping/>
-  </p:clrMapOvr>
-</p:sld>
-</file>
-
-<file path=ppt/slides/slide7.xml><?xml version="1.0" encoding="utf-8"?>
-<p:sld xmlns:a="http://schemas.openxmlformats.org/drawingml/2006/main" xmlns:r="http://schemas.openxmlformats.org/officeDocument/2006/relationships" xmlns:p="http://schemas.openxmlformats.org/presentationml/2006/main">
-  <p:cSld>
-    <p:spTree>
-      <p:nvGrpSpPr>
-        <p:cNvPr id="1" name=""/>
-        <p:cNvGrpSpPr/>
-        <p:nvPr/>
-      </p:nvGrpSpPr>
-      <p:grpSpPr>
-        <a:xfrm>
-          <a:off x="0" y="0"/>
-          <a:ext cx="0" cy="0"/>
-          <a:chOff x="0" y="0"/>
-          <a:chExt cx="0" cy="0"/>
-        </a:xfrm>
-      </p:grpSpPr>
-      <p:sp>
-        <p:nvSpPr>
-          <p:cNvPr id="2" name="Title 1">
-            <a:extLst>
-              <a:ext uri="{FF2B5EF4-FFF2-40B4-BE49-F238E27FC236}">
-                <a16:creationId xmlns:a16="http://schemas.microsoft.com/office/drawing/2014/main" id="{43EE6C72-03D5-F7F0-1189-4C7BA75BAA61}"/>
-              </a:ext>
-            </a:extLst>
-          </p:cNvPr>
-          <p:cNvSpPr>
-            <a:spLocks noGrp="1"/>
-          </p:cNvSpPr>
-          <p:nvPr>
-            <p:ph type="title"/>
-          </p:nvPr>
-        </p:nvSpPr>
-        <p:spPr/>
-        <p:txBody>
-          <a:bodyPr/>
-          <a:lstStyle/>
-          <a:p>
-            <a:r>
-              <a:rPr lang="en-US" dirty="0"/>
-              <a:t>Data exploration </a:t>
-            </a:r>
-          </a:p>
-        </p:txBody>
-      </p:sp>
-      <p:sp>
-        <p:nvSpPr>
-          <p:cNvPr id="3" name="Content Placeholder 2">
-            <a:extLst>
-              <a:ext uri="{FF2B5EF4-FFF2-40B4-BE49-F238E27FC236}">
-                <a16:creationId xmlns:a16="http://schemas.microsoft.com/office/drawing/2014/main" id="{2CAC2674-75A1-6757-F8C2-5CD61FD6D8AE}"/>
-              </a:ext>
-            </a:extLst>
-          </p:cNvPr>
-          <p:cNvSpPr>
-            <a:spLocks noGrp="1"/>
-          </p:cNvSpPr>
-          <p:nvPr>
-            <p:ph idx="1"/>
-          </p:nvPr>
-        </p:nvSpPr>
-        <p:spPr/>
-        <p:txBody>
-          <a:bodyPr/>
-          <a:lstStyle/>
-          <a:p>
-            <a:r>
-              <a:rPr lang="en-US" dirty="0">
-                <a:highlight>
-                  <a:srgbClr val="FFFF00"/>
-                </a:highlight>
-              </a:rPr>
-              <a:t>How many columns? How many rows?</a:t>
-            </a:r>
-          </a:p>
-          <a:p>
-            <a:r>
-              <a:rPr lang="en-US" dirty="0">
-                <a:highlight>
-                  <a:srgbClr val="FFFF00"/>
-                </a:highlight>
-              </a:rPr>
-              <a:t>Are there missing values? How many (%)? </a:t>
-            </a:r>
-          </a:p>
-          <a:p>
-            <a:r>
-              <a:rPr lang="en-US" dirty="0">
-                <a:highlight>
-                  <a:srgbClr val="FFFF00"/>
-                </a:highlight>
-              </a:rPr>
-              <a:t>Use descriptive statistics </a:t>
-            </a:r>
-          </a:p>
-          <a:p>
-            <a:r>
-              <a:rPr lang="en-US" dirty="0">
-                <a:highlight>
-                  <a:srgbClr val="FFFF00"/>
-                </a:highlight>
-              </a:rPr>
-              <a:t>Use data visualization (include screenshots)  </a:t>
-            </a:r>
-          </a:p>
-          <a:p>
-            <a:r>
-              <a:rPr lang="en-US" dirty="0">
-                <a:highlight>
-                  <a:srgbClr val="FFFF00"/>
-                </a:highlight>
-              </a:rPr>
-              <a:t>Tell a story about what happened? </a:t>
-            </a:r>
-          </a:p>
-          <a:p>
-            <a:r>
-              <a:rPr lang="en-US" dirty="0">
-                <a:highlight>
-                  <a:srgbClr val="FFFF00"/>
-                </a:highlight>
-              </a:rPr>
-              <a:t>Add slides as you want </a:t>
-            </a:r>
-          </a:p>
-        </p:txBody>
-      </p:sp>
-      <p:sp>
-        <p:nvSpPr>
-          <p:cNvPr id="4" name="Slide Number Placeholder 3">
-            <a:extLst>
-              <a:ext uri="{FF2B5EF4-FFF2-40B4-BE49-F238E27FC236}">
-                <a16:creationId xmlns:a16="http://schemas.microsoft.com/office/drawing/2014/main" id="{AB66E3E2-AAD8-F512-2126-60AF9A4F7C65}"/>
-              </a:ext>
-            </a:extLst>
-          </p:cNvPr>
-          <p:cNvSpPr>
-            <a:spLocks noGrp="1"/>
-          </p:cNvSpPr>
-          <p:nvPr>
-            <p:ph type="sldNum" sz="quarter" idx="12"/>
-          </p:nvPr>
-        </p:nvSpPr>
-        <p:spPr/>
-        <p:txBody>
-          <a:bodyPr/>
-          <a:lstStyle/>
-          <a:p>
-            <a:fld id="{F56AC8B8-03BA-4745-994C-072AEE7EB195}" type="slidenum">
-              <a:rPr lang="en-US" smtClean="0"/>
-              <a:t>7</a:t>
-            </a:fld>
-            <a:endParaRPr lang="en-US"/>
-          </a:p>
-        </p:txBody>
-      </p:sp>
-    </p:spTree>
-    <p:extLst>
-      <p:ext uri="{BB962C8B-B14F-4D97-AF65-F5344CB8AC3E}">
-        <p14:creationId xmlns:p14="http://schemas.microsoft.com/office/powerpoint/2010/main" val="2781225567"/>
-      </p:ext>
-    </p:extLst>
-  </p:cSld>
-  <p:clrMapOvr>
-    <a:masterClrMapping/>
-  </p:clrMapOvr>
-</p:sld>
-</file>
-
-<file path=ppt/slides/slide8.xml><?xml version="1.0" encoding="utf-8"?>
-<p:sld xmlns:a="http://schemas.openxmlformats.org/drawingml/2006/main" xmlns:r="http://schemas.openxmlformats.org/officeDocument/2006/relationships" xmlns:p="http://schemas.openxmlformats.org/presentationml/2006/main">
-  <p:cSld>
-    <p:spTree>
-      <p:nvGrpSpPr>
-        <p:cNvPr id="1" name=""/>
-        <p:cNvGrpSpPr/>
-        <p:nvPr/>
-      </p:nvGrpSpPr>
-      <p:grpSpPr>
-        <a:xfrm>
-          <a:off x="0" y="0"/>
-          <a:ext cx="0" cy="0"/>
-          <a:chOff x="0" y="0"/>
-          <a:chExt cx="0" cy="0"/>
-        </a:xfrm>
-      </p:grpSpPr>
-      <p:sp>
-        <p:nvSpPr>
-          <p:cNvPr id="4" name="Title 3">
-            <a:extLst>
-              <a:ext uri="{FF2B5EF4-FFF2-40B4-BE49-F238E27FC236}">
-                <a16:creationId xmlns:a16="http://schemas.microsoft.com/office/drawing/2014/main" id="{A8348381-F94E-1E08-559A-B780DCA65C20}"/>
-              </a:ext>
-            </a:extLst>
-          </p:cNvPr>
-          <p:cNvSpPr>
-            <a:spLocks noGrp="1"/>
-          </p:cNvSpPr>
-          <p:nvPr>
-            <p:ph type="title"/>
-          </p:nvPr>
-        </p:nvSpPr>
-        <p:spPr/>
-        <p:txBody>
-          <a:bodyPr/>
-          <a:lstStyle/>
-          <a:p>
-            <a:r>
-              <a:rPr lang="en-US" dirty="0"/>
-              <a:t>Data Preparation </a:t>
-            </a:r>
-          </a:p>
-        </p:txBody>
-      </p:sp>
-      <p:sp>
-        <p:nvSpPr>
-          <p:cNvPr id="2" name="Slide Number Placeholder 1">
-            <a:extLst>
-              <a:ext uri="{FF2B5EF4-FFF2-40B4-BE49-F238E27FC236}">
-                <a16:creationId xmlns:a16="http://schemas.microsoft.com/office/drawing/2014/main" id="{B846FC3F-E470-CBDC-61DA-F54A1F4524F3}"/>
-              </a:ext>
-            </a:extLst>
-          </p:cNvPr>
-          <p:cNvSpPr>
-            <a:spLocks noGrp="1"/>
-          </p:cNvSpPr>
-          <p:nvPr>
-            <p:ph type="sldNum" sz="quarter" idx="12"/>
-          </p:nvPr>
-        </p:nvSpPr>
-        <p:spPr/>
-        <p:txBody>
-          <a:bodyPr/>
-          <a:lstStyle/>
-          <a:p>
-            <a:fld id="{F56AC8B8-03BA-4745-994C-072AEE7EB195}" type="slidenum">
-              <a:rPr lang="en-US" smtClean="0"/>
-              <a:t>8</a:t>
-            </a:fld>
-            <a:endParaRPr lang="en-US"/>
-          </a:p>
-        </p:txBody>
-      </p:sp>
-    </p:spTree>
-    <p:extLst>
-      <p:ext uri="{BB962C8B-B14F-4D97-AF65-F5344CB8AC3E}">
-        <p14:creationId xmlns:p14="http://schemas.microsoft.com/office/powerpoint/2010/main" val="4055406362"/>
-      </p:ext>
-    </p:extLst>
-  </p:cSld>
-  <p:clrMapOvr>
-    <a:masterClrMapping/>
-  </p:clrMapOvr>
-</p:sld>
-</file>
-
-<file path=ppt/slides/slide9.xml><?xml version="1.0" encoding="utf-8"?>
-<p:sld xmlns:a="http://schemas.openxmlformats.org/drawingml/2006/main" xmlns:r="http://schemas.openxmlformats.org/officeDocument/2006/relationships" xmlns:p="http://schemas.openxmlformats.org/presentationml/2006/main">
-  <p:cSld>
-    <p:spTree>
-      <p:nvGrpSpPr>
-        <p:cNvPr id="1" name=""/>
-        <p:cNvGrpSpPr/>
-        <p:nvPr/>
-      </p:nvGrpSpPr>
-      <p:grpSpPr>
-        <a:xfrm>
-          <a:off x="0" y="0"/>
-          <a:ext cx="0" cy="0"/>
-          <a:chOff x="0" y="0"/>
-          <a:chExt cx="0" cy="0"/>
-        </a:xfrm>
-      </p:grpSpPr>
-      <p:sp>
-        <p:nvSpPr>
-          <p:cNvPr id="2" name="Title 1">
-            <a:extLst>
-              <a:ext uri="{FF2B5EF4-FFF2-40B4-BE49-F238E27FC236}">
-                <a16:creationId xmlns:a16="http://schemas.microsoft.com/office/drawing/2014/main" id="{43EE6C72-03D5-F7F0-1189-4C7BA75BAA61}"/>
-              </a:ext>
-            </a:extLst>
-          </p:cNvPr>
-          <p:cNvSpPr>
-            <a:spLocks noGrp="1"/>
-          </p:cNvSpPr>
-          <p:nvPr>
-            <p:ph type="title"/>
-          </p:nvPr>
-        </p:nvSpPr>
-        <p:spPr/>
-        <p:txBody>
-          <a:bodyPr/>
-          <a:lstStyle/>
-          <a:p>
-            <a:r>
-              <a:rPr lang="en-US" dirty="0"/>
-              <a:t>Data preparation </a:t>
-            </a:r>
-          </a:p>
-        </p:txBody>
-      </p:sp>
-      <p:sp>
-        <p:nvSpPr>
-          <p:cNvPr id="3" name="Content Placeholder 2">
-            <a:extLst>
-              <a:ext uri="{FF2B5EF4-FFF2-40B4-BE49-F238E27FC236}">
-                <a16:creationId xmlns:a16="http://schemas.microsoft.com/office/drawing/2014/main" id="{2CAC2674-75A1-6757-F8C2-5CD61FD6D8AE}"/>
-              </a:ext>
-            </a:extLst>
-          </p:cNvPr>
-          <p:cNvSpPr>
-            <a:spLocks noGrp="1"/>
-          </p:cNvSpPr>
-          <p:nvPr>
-            <p:ph idx="1"/>
-          </p:nvPr>
-        </p:nvSpPr>
-        <p:spPr/>
-        <p:txBody>
-          <a:bodyPr>
-            <a:normAutofit/>
-          </a:bodyPr>
-          <a:lstStyle/>
-          <a:p>
-            <a:r>
-              <a:rPr lang="en-US" dirty="0">
-                <a:highlight>
-                  <a:srgbClr val="FFFF00"/>
-                </a:highlight>
-              </a:rPr>
-              <a:t>Describe how you Clean the data </a:t>
-            </a:r>
-          </a:p>
-          <a:p>
-            <a:r>
-              <a:rPr lang="en-US" dirty="0">
-                <a:highlight>
-                  <a:srgbClr val="FFFF00"/>
-                </a:highlight>
-              </a:rPr>
-              <a:t>Describe how you Applied data transformation</a:t>
-            </a:r>
-          </a:p>
-          <a:p>
-            <a:r>
-              <a:rPr lang="en-US" dirty="0">
-                <a:highlight>
-                  <a:srgbClr val="FFFF00"/>
-                </a:highlight>
-              </a:rPr>
-              <a:t>How you split data (include table that describe %) </a:t>
-            </a:r>
-          </a:p>
-          <a:p>
-            <a:endParaRPr lang="en-US" dirty="0">
-              <a:highlight>
-                <a:srgbClr val="FFFF00"/>
-              </a:highlight>
-            </a:endParaRPr>
-          </a:p>
-          <a:p>
-            <a:endParaRPr lang="en-US" dirty="0">
-              <a:highlight>
-                <a:srgbClr val="FFFF00"/>
-              </a:highlight>
-            </a:endParaRPr>
-          </a:p>
-          <a:p>
-            <a:endParaRPr lang="en-US" dirty="0">
-              <a:highlight>
-                <a:srgbClr val="FFFF00"/>
-              </a:highlight>
-            </a:endParaRPr>
-          </a:p>
-          <a:p>
-            <a:endParaRPr lang="en-US" dirty="0">
-              <a:highlight>
-                <a:srgbClr val="FFFF00"/>
-              </a:highlight>
-            </a:endParaRPr>
-          </a:p>
-          <a:p>
-            <a:r>
-              <a:rPr lang="en-US" dirty="0">
-                <a:highlight>
-                  <a:srgbClr val="FFFF00"/>
-                </a:highlight>
-              </a:rPr>
-              <a:t>Add slides as you want </a:t>
-            </a:r>
-          </a:p>
-          <a:p>
-            <a:endParaRPr lang="en-US" dirty="0">
-              <a:highlight>
-                <a:srgbClr val="FFFF00"/>
-              </a:highlight>
-            </a:endParaRPr>
-          </a:p>
-          <a:p>
-            <a:endParaRPr lang="en-US" dirty="0">
-              <a:highlight>
-                <a:srgbClr val="FFFF00"/>
-              </a:highlight>
-            </a:endParaRPr>
-          </a:p>
-        </p:txBody>
-      </p:sp>
-      <p:sp>
-        <p:nvSpPr>
-          <p:cNvPr id="4" name="Slide Number Placeholder 3">
-            <a:extLst>
-              <a:ext uri="{FF2B5EF4-FFF2-40B4-BE49-F238E27FC236}">
-                <a16:creationId xmlns:a16="http://schemas.microsoft.com/office/drawing/2014/main" id="{961E8B88-E2C4-B94E-234F-852C9F142D84}"/>
-              </a:ext>
-            </a:extLst>
-          </p:cNvPr>
-          <p:cNvSpPr>
-            <a:spLocks noGrp="1"/>
-          </p:cNvSpPr>
-          <p:nvPr>
-            <p:ph type="sldNum" sz="quarter" idx="12"/>
-          </p:nvPr>
-        </p:nvSpPr>
-        <p:spPr/>
-        <p:txBody>
-          <a:bodyPr/>
-          <a:lstStyle/>
-          <a:p>
-            <a:fld id="{F56AC8B8-03BA-4745-994C-072AEE7EB195}" type="slidenum">
-              <a:rPr lang="en-US" smtClean="0"/>
-              <a:t>9</a:t>
+              <a:t>21</a:t>
             </a:fld>
             <a:endParaRPr lang="en-US"/>
           </a:p>
@@ -5572,7 +5386,7 @@
           <p:cNvPr id="5" name="Table 5">
             <a:extLst>
               <a:ext uri="{FF2B5EF4-FFF2-40B4-BE49-F238E27FC236}">
-                <a16:creationId xmlns:a16="http://schemas.microsoft.com/office/drawing/2014/main" id="{FE7F9863-7595-1158-A37E-D810627B3F26}"/>
+                <a16:creationId xmlns:a16="http://schemas.microsoft.com/office/drawing/2014/main" id="{CA1A9388-8764-C353-A334-CC7752D62D3F}"/>
               </a:ext>
             </a:extLst>
           </p:cNvPr>
@@ -5582,14 +5396,14 @@
           <p:nvPr>
             <p:extLst>
               <p:ext uri="{D42A27DB-BD31-4B8C-83A1-F6EECF244321}">
-                <p14:modId xmlns:p14="http://schemas.microsoft.com/office/powerpoint/2010/main" val="4179408968"/>
+                <p14:modId xmlns:p14="http://schemas.microsoft.com/office/powerpoint/2010/main" val="1766991673"/>
               </p:ext>
             </p:extLst>
           </p:nvPr>
         </p:nvGraphicFramePr>
         <p:xfrm>
-          <a:off x="2375949" y="3445034"/>
-          <a:ext cx="6096000" cy="1112520"/>
+          <a:off x="1841157" y="2928551"/>
+          <a:ext cx="6630792" cy="1629003"/>
         </p:xfrm>
         <a:graphic>
           <a:graphicData uri="http://schemas.openxmlformats.org/drawingml/2006/table">
@@ -5598,21 +5412,21 @@
                 <a:tableStyleId>{5C22544A-7EE6-4342-B048-85BDC9FD1C3A}</a:tableStyleId>
               </a:tblPr>
               <a:tblGrid>
-                <a:gridCol w="2032000">
+                <a:gridCol w="2210264">
                   <a:extLst>
                     <a:ext uri="{9D8B030D-6E8A-4147-A177-3AD203B41FA5}">
                       <a16:colId xmlns:a16="http://schemas.microsoft.com/office/drawing/2014/main" val="4222841356"/>
                     </a:ext>
                   </a:extLst>
                 </a:gridCol>
-                <a:gridCol w="2032000">
+                <a:gridCol w="2210264">
                   <a:extLst>
                     <a:ext uri="{9D8B030D-6E8A-4147-A177-3AD203B41FA5}">
                       <a16:colId xmlns:a16="http://schemas.microsoft.com/office/drawing/2014/main" val="1518392877"/>
                     </a:ext>
                   </a:extLst>
                 </a:gridCol>
-                <a:gridCol w="2032000">
+                <a:gridCol w="2210264">
                   <a:extLst>
                     <a:ext uri="{9D8B030D-6E8A-4147-A177-3AD203B41FA5}">
                       <a16:colId xmlns:a16="http://schemas.microsoft.com/office/drawing/2014/main" val="3499520907"/>
@@ -5620,7 +5434,7 @@
                   </a:extLst>
                 </a:gridCol>
               </a:tblGrid>
-              <a:tr h="370840">
+              <a:tr h="543001">
                 <a:tc>
                   <a:txBody>
                     <a:bodyPr/>
@@ -5666,7 +5480,7 @@
                   </a:ext>
                 </a:extLst>
               </a:tr>
-              <a:tr h="370840">
+              <a:tr h="543001">
                 <a:tc>
                   <a:txBody>
                     <a:bodyPr/>
@@ -5674,7 +5488,7 @@
                     <a:p>
                       <a:r>
                         <a:rPr lang="en-US" dirty="0"/>
-                        <a:t>Train </a:t>
+                        <a:t>Training data</a:t>
                       </a:r>
                     </a:p>
                   </a:txBody>
@@ -5685,7 +5499,10 @@
                     <a:bodyPr/>
                     <a:lstStyle/>
                     <a:p>
-                      <a:endParaRPr lang="en-US" dirty="0"/>
+                      <a:r>
+                        <a:rPr lang="en-US" dirty="0"/>
+                        <a:t>702</a:t>
+                      </a:r>
                     </a:p>
                   </a:txBody>
                   <a:tcPr/>
@@ -5695,7 +5512,10 @@
                     <a:bodyPr/>
                     <a:lstStyle/>
                     <a:p>
-                      <a:endParaRPr lang="en-US" dirty="0"/>
+                      <a:r>
+                        <a:rPr lang="en-US" dirty="0"/>
+                        <a:t>25%</a:t>
+                      </a:r>
                     </a:p>
                   </a:txBody>
                   <a:tcPr/>
@@ -5706,7 +5526,7 @@
                   </a:ext>
                 </a:extLst>
               </a:tr>
-              <a:tr h="370840">
+              <a:tr h="543001">
                 <a:tc>
                   <a:txBody>
                     <a:bodyPr/>
@@ -5714,7 +5534,7 @@
                     <a:p>
                       <a:r>
                         <a:rPr lang="en-US" dirty="0"/>
-                        <a:t>Test </a:t>
+                        <a:t>Testing data</a:t>
                       </a:r>
                     </a:p>
                   </a:txBody>
@@ -5725,7 +5545,10 @@
                     <a:bodyPr/>
                     <a:lstStyle/>
                     <a:p>
-                      <a:endParaRPr lang="en-US"/>
+                      <a:r>
+                        <a:rPr lang="en-US" dirty="0"/>
+                        <a:t>235</a:t>
+                      </a:r>
                     </a:p>
                   </a:txBody>
                   <a:tcPr/>
@@ -5735,7 +5558,10 @@
                     <a:bodyPr/>
                     <a:lstStyle/>
                     <a:p>
-                      <a:endParaRPr lang="en-US" dirty="0"/>
+                      <a:r>
+                        <a:rPr lang="en-US" dirty="0"/>
+                        <a:t>75%</a:t>
+                      </a:r>
                     </a:p>
                   </a:txBody>
                   <a:tcPr/>
@@ -5753,7 +5579,2113 @@
     </p:spTree>
     <p:extLst>
       <p:ext uri="{BB962C8B-B14F-4D97-AF65-F5344CB8AC3E}">
-        <p14:creationId xmlns:p14="http://schemas.microsoft.com/office/powerpoint/2010/main" val="2543842627"/>
+        <p14:creationId xmlns:p14="http://schemas.microsoft.com/office/powerpoint/2010/main" val="1170772113"/>
+      </p:ext>
+    </p:extLst>
+  </p:cSld>
+  <p:clrMapOvr>
+    <a:masterClrMapping/>
+  </p:clrMapOvr>
+</p:sld>
+</file>
+
+<file path=ppt/slides/slide22.xml><?xml version="1.0" encoding="utf-8"?>
+<p:sld xmlns:a="http://schemas.openxmlformats.org/drawingml/2006/main" xmlns:r="http://schemas.openxmlformats.org/officeDocument/2006/relationships" xmlns:p="http://schemas.openxmlformats.org/presentationml/2006/main">
+  <p:cSld>
+    <p:spTree>
+      <p:nvGrpSpPr>
+        <p:cNvPr id="1" name=""/>
+        <p:cNvGrpSpPr/>
+        <p:nvPr/>
+      </p:nvGrpSpPr>
+      <p:grpSpPr>
+        <a:xfrm>
+          <a:off x="0" y="0"/>
+          <a:ext cx="0" cy="0"/>
+          <a:chOff x="0" y="0"/>
+          <a:chExt cx="0" cy="0"/>
+        </a:xfrm>
+      </p:grpSpPr>
+      <p:sp>
+        <p:nvSpPr>
+          <p:cNvPr id="2" name="Title 1">
+            <a:extLst>
+              <a:ext uri="{FF2B5EF4-FFF2-40B4-BE49-F238E27FC236}">
+                <a16:creationId xmlns:a16="http://schemas.microsoft.com/office/drawing/2014/main" id="{59F62455-2127-5F4D-D1D8-F2A0DFE70FA5}"/>
+              </a:ext>
+            </a:extLst>
+          </p:cNvPr>
+          <p:cNvSpPr>
+            <a:spLocks noGrp="1"/>
+          </p:cNvSpPr>
+          <p:nvPr>
+            <p:ph type="title"/>
+          </p:nvPr>
+        </p:nvSpPr>
+        <p:spPr/>
+        <p:txBody>
+          <a:bodyPr/>
+          <a:lstStyle/>
+          <a:p>
+            <a:r>
+              <a:rPr lang="en-US" dirty="0"/>
+              <a:t>Splitting Data into (Training – Testing)</a:t>
+            </a:r>
+          </a:p>
+        </p:txBody>
+      </p:sp>
+      <p:pic>
+        <p:nvPicPr>
+          <p:cNvPr id="6" name="Content Placeholder 5">
+            <a:extLst>
+              <a:ext uri="{FF2B5EF4-FFF2-40B4-BE49-F238E27FC236}">
+                <a16:creationId xmlns:a16="http://schemas.microsoft.com/office/drawing/2014/main" id="{A0032CC2-94B9-68F3-421D-70AA84D1CF9E}"/>
+              </a:ext>
+            </a:extLst>
+          </p:cNvPr>
+          <p:cNvPicPr>
+            <a:picLocks noGrp="1" noChangeAspect="1"/>
+          </p:cNvPicPr>
+          <p:nvPr>
+            <p:ph idx="1"/>
+          </p:nvPr>
+        </p:nvPicPr>
+        <p:blipFill>
+          <a:blip r:embed="rId2">
+            <a:extLst>
+              <a:ext uri="{28A0092B-C50C-407E-A947-70E740481C1C}">
+                <a14:useLocalDpi xmlns:a14="http://schemas.microsoft.com/office/drawing/2010/main" val="0"/>
+              </a:ext>
+            </a:extLst>
+          </a:blip>
+          <a:stretch>
+            <a:fillRect/>
+          </a:stretch>
+        </p:blipFill>
+        <p:spPr>
+          <a:xfrm>
+            <a:off x="440691" y="1941808"/>
+            <a:ext cx="11310618" cy="2974384"/>
+          </a:xfrm>
+        </p:spPr>
+      </p:pic>
+      <p:sp>
+        <p:nvSpPr>
+          <p:cNvPr id="4" name="Slide Number Placeholder 3">
+            <a:extLst>
+              <a:ext uri="{FF2B5EF4-FFF2-40B4-BE49-F238E27FC236}">
+                <a16:creationId xmlns:a16="http://schemas.microsoft.com/office/drawing/2014/main" id="{6C8C6A6F-857D-3A17-A290-50D88DC18BA0}"/>
+              </a:ext>
+            </a:extLst>
+          </p:cNvPr>
+          <p:cNvSpPr>
+            <a:spLocks noGrp="1"/>
+          </p:cNvSpPr>
+          <p:nvPr>
+            <p:ph type="sldNum" sz="quarter" idx="12"/>
+          </p:nvPr>
+        </p:nvSpPr>
+        <p:spPr/>
+        <p:txBody>
+          <a:bodyPr/>
+          <a:lstStyle/>
+          <a:p>
+            <a:fld id="{F56AC8B8-03BA-4745-994C-072AEE7EB195}" type="slidenum">
+              <a:rPr lang="en-US" smtClean="0"/>
+              <a:t>22</a:t>
+            </a:fld>
+            <a:endParaRPr lang="en-US"/>
+          </a:p>
+        </p:txBody>
+      </p:sp>
+    </p:spTree>
+    <p:extLst>
+      <p:ext uri="{BB962C8B-B14F-4D97-AF65-F5344CB8AC3E}">
+        <p14:creationId xmlns:p14="http://schemas.microsoft.com/office/powerpoint/2010/main" val="3150468988"/>
+      </p:ext>
+    </p:extLst>
+  </p:cSld>
+  <p:clrMapOvr>
+    <a:masterClrMapping/>
+  </p:clrMapOvr>
+</p:sld>
+</file>
+
+<file path=ppt/slides/slide23.xml><?xml version="1.0" encoding="utf-8"?>
+<p:sld xmlns:a="http://schemas.openxmlformats.org/drawingml/2006/main" xmlns:r="http://schemas.openxmlformats.org/officeDocument/2006/relationships" xmlns:p="http://schemas.openxmlformats.org/presentationml/2006/main">
+  <p:cSld>
+    <p:spTree>
+      <p:nvGrpSpPr>
+        <p:cNvPr id="1" name=""/>
+        <p:cNvGrpSpPr/>
+        <p:nvPr/>
+      </p:nvGrpSpPr>
+      <p:grpSpPr>
+        <a:xfrm>
+          <a:off x="0" y="0"/>
+          <a:ext cx="0" cy="0"/>
+          <a:chOff x="0" y="0"/>
+          <a:chExt cx="0" cy="0"/>
+        </a:xfrm>
+      </p:grpSpPr>
+      <p:sp>
+        <p:nvSpPr>
+          <p:cNvPr id="4" name="Title 3">
+            <a:extLst>
+              <a:ext uri="{FF2B5EF4-FFF2-40B4-BE49-F238E27FC236}">
+                <a16:creationId xmlns:a16="http://schemas.microsoft.com/office/drawing/2014/main" id="{A8348381-F94E-1E08-559A-B780DCA65C20}"/>
+              </a:ext>
+            </a:extLst>
+          </p:cNvPr>
+          <p:cNvSpPr>
+            <a:spLocks noGrp="1"/>
+          </p:cNvSpPr>
+          <p:nvPr>
+            <p:ph type="title"/>
+          </p:nvPr>
+        </p:nvSpPr>
+        <p:spPr/>
+        <p:txBody>
+          <a:bodyPr/>
+          <a:lstStyle/>
+          <a:p>
+            <a:r>
+              <a:rPr lang="en-US" dirty="0"/>
+              <a:t>Predictive Analytics </a:t>
+            </a:r>
+          </a:p>
+        </p:txBody>
+      </p:sp>
+      <p:sp>
+        <p:nvSpPr>
+          <p:cNvPr id="2" name="Slide Number Placeholder 1">
+            <a:extLst>
+              <a:ext uri="{FF2B5EF4-FFF2-40B4-BE49-F238E27FC236}">
+                <a16:creationId xmlns:a16="http://schemas.microsoft.com/office/drawing/2014/main" id="{0DD0E005-37CB-96D0-B550-B0EF82B0AFEB}"/>
+              </a:ext>
+            </a:extLst>
+          </p:cNvPr>
+          <p:cNvSpPr>
+            <a:spLocks noGrp="1"/>
+          </p:cNvSpPr>
+          <p:nvPr>
+            <p:ph type="sldNum" sz="quarter" idx="12"/>
+          </p:nvPr>
+        </p:nvSpPr>
+        <p:spPr/>
+        <p:txBody>
+          <a:bodyPr/>
+          <a:lstStyle/>
+          <a:p>
+            <a:fld id="{F56AC8B8-03BA-4745-994C-072AEE7EB195}" type="slidenum">
+              <a:rPr lang="en-US" smtClean="0"/>
+              <a:t>23</a:t>
+            </a:fld>
+            <a:endParaRPr lang="en-US"/>
+          </a:p>
+        </p:txBody>
+      </p:sp>
+    </p:spTree>
+    <p:extLst>
+      <p:ext uri="{BB962C8B-B14F-4D97-AF65-F5344CB8AC3E}">
+        <p14:creationId xmlns:p14="http://schemas.microsoft.com/office/powerpoint/2010/main" val="3752500180"/>
+      </p:ext>
+    </p:extLst>
+  </p:cSld>
+  <p:clrMapOvr>
+    <a:masterClrMapping/>
+  </p:clrMapOvr>
+</p:sld>
+</file>
+
+<file path=ppt/slides/slide24.xml><?xml version="1.0" encoding="utf-8"?>
+<p:sld xmlns:a="http://schemas.openxmlformats.org/drawingml/2006/main" xmlns:r="http://schemas.openxmlformats.org/officeDocument/2006/relationships" xmlns:p="http://schemas.openxmlformats.org/presentationml/2006/main">
+  <p:cSld>
+    <p:spTree>
+      <p:nvGrpSpPr>
+        <p:cNvPr id="1" name=""/>
+        <p:cNvGrpSpPr/>
+        <p:nvPr/>
+      </p:nvGrpSpPr>
+      <p:grpSpPr>
+        <a:xfrm>
+          <a:off x="0" y="0"/>
+          <a:ext cx="0" cy="0"/>
+          <a:chOff x="0" y="0"/>
+          <a:chExt cx="0" cy="0"/>
+        </a:xfrm>
+      </p:grpSpPr>
+      <p:sp>
+        <p:nvSpPr>
+          <p:cNvPr id="2" name="Title 1">
+            <a:extLst>
+              <a:ext uri="{FF2B5EF4-FFF2-40B4-BE49-F238E27FC236}">
+                <a16:creationId xmlns:a16="http://schemas.microsoft.com/office/drawing/2014/main" id="{43EE6C72-03D5-F7F0-1189-4C7BA75BAA61}"/>
+              </a:ext>
+            </a:extLst>
+          </p:cNvPr>
+          <p:cNvSpPr>
+            <a:spLocks noGrp="1"/>
+          </p:cNvSpPr>
+          <p:nvPr>
+            <p:ph type="title"/>
+          </p:nvPr>
+        </p:nvSpPr>
+        <p:spPr/>
+        <p:txBody>
+          <a:bodyPr/>
+          <a:lstStyle/>
+          <a:p>
+            <a:r>
+              <a:rPr lang="en-US" dirty="0"/>
+              <a:t>Predictive Analytics </a:t>
+            </a:r>
+          </a:p>
+        </p:txBody>
+      </p:sp>
+      <p:sp>
+        <p:nvSpPr>
+          <p:cNvPr id="3" name="Content Placeholder 2">
+            <a:extLst>
+              <a:ext uri="{FF2B5EF4-FFF2-40B4-BE49-F238E27FC236}">
+                <a16:creationId xmlns:a16="http://schemas.microsoft.com/office/drawing/2014/main" id="{2CAC2674-75A1-6757-F8C2-5CD61FD6D8AE}"/>
+              </a:ext>
+            </a:extLst>
+          </p:cNvPr>
+          <p:cNvSpPr>
+            <a:spLocks noGrp="1"/>
+          </p:cNvSpPr>
+          <p:nvPr>
+            <p:ph idx="1"/>
+          </p:nvPr>
+        </p:nvSpPr>
+        <p:spPr/>
+        <p:txBody>
+          <a:bodyPr/>
+          <a:lstStyle/>
+          <a:p>
+            <a:r>
+              <a:rPr lang="en-US" dirty="0"/>
+              <a:t>Fitting the model to the data:</a:t>
+            </a:r>
+          </a:p>
+          <a:p>
+            <a:r>
+              <a:rPr lang="en-US" dirty="0"/>
+              <a:t>We use </a:t>
+            </a:r>
+            <a:r>
+              <a:rPr lang="en-US" dirty="0" err="1"/>
+              <a:t>RandomForest</a:t>
+            </a:r>
+            <a:r>
+              <a:rPr lang="en-US" dirty="0"/>
+              <a:t> Algorithm to test the model.</a:t>
+            </a:r>
+          </a:p>
+          <a:p>
+            <a:r>
+              <a:rPr lang="en-US" dirty="0"/>
+              <a:t>We use Data Augmentation (Oversampling) to generate more data for the minority class because the data was imbalanced.</a:t>
+            </a:r>
+          </a:p>
+          <a:p>
+            <a:r>
+              <a:rPr lang="en-US" dirty="0"/>
+              <a:t>we split this phase into two sections:</a:t>
+            </a:r>
+          </a:p>
+          <a:p>
+            <a:pPr lvl="1"/>
+            <a:r>
+              <a:rPr lang="en-US" dirty="0"/>
+              <a:t>Before oversampling minority class </a:t>
+            </a:r>
+          </a:p>
+          <a:p>
+            <a:pPr lvl="1"/>
+            <a:r>
+              <a:rPr lang="en-US" dirty="0"/>
+              <a:t>After oversampling minority class</a:t>
+            </a:r>
+          </a:p>
+          <a:p>
+            <a:endParaRPr lang="en-US" dirty="0">
+              <a:highlight>
+                <a:srgbClr val="FFFF00"/>
+              </a:highlight>
+            </a:endParaRPr>
+          </a:p>
+        </p:txBody>
+      </p:sp>
+      <p:sp>
+        <p:nvSpPr>
+          <p:cNvPr id="4" name="Slide Number Placeholder 3">
+            <a:extLst>
+              <a:ext uri="{FF2B5EF4-FFF2-40B4-BE49-F238E27FC236}">
+                <a16:creationId xmlns:a16="http://schemas.microsoft.com/office/drawing/2014/main" id="{6E7402AE-3162-E566-6569-94049FBDD12C}"/>
+              </a:ext>
+            </a:extLst>
+          </p:cNvPr>
+          <p:cNvSpPr>
+            <a:spLocks noGrp="1"/>
+          </p:cNvSpPr>
+          <p:nvPr>
+            <p:ph type="sldNum" sz="quarter" idx="12"/>
+          </p:nvPr>
+        </p:nvSpPr>
+        <p:spPr/>
+        <p:txBody>
+          <a:bodyPr/>
+          <a:lstStyle/>
+          <a:p>
+            <a:fld id="{F56AC8B8-03BA-4745-994C-072AEE7EB195}" type="slidenum">
+              <a:rPr lang="en-US" smtClean="0"/>
+              <a:t>24</a:t>
+            </a:fld>
+            <a:endParaRPr lang="en-US"/>
+          </a:p>
+        </p:txBody>
+      </p:sp>
+    </p:spTree>
+    <p:extLst>
+      <p:ext uri="{BB962C8B-B14F-4D97-AF65-F5344CB8AC3E}">
+        <p14:creationId xmlns:p14="http://schemas.microsoft.com/office/powerpoint/2010/main" val="906962141"/>
+      </p:ext>
+    </p:extLst>
+  </p:cSld>
+  <p:clrMapOvr>
+    <a:masterClrMapping/>
+  </p:clrMapOvr>
+</p:sld>
+</file>
+
+<file path=ppt/slides/slide25.xml><?xml version="1.0" encoding="utf-8"?>
+<p:sld xmlns:a="http://schemas.openxmlformats.org/drawingml/2006/main" xmlns:r="http://schemas.openxmlformats.org/officeDocument/2006/relationships" xmlns:p="http://schemas.openxmlformats.org/presentationml/2006/main">
+  <p:cSld>
+    <p:spTree>
+      <p:nvGrpSpPr>
+        <p:cNvPr id="1" name=""/>
+        <p:cNvGrpSpPr/>
+        <p:nvPr/>
+      </p:nvGrpSpPr>
+      <p:grpSpPr>
+        <a:xfrm>
+          <a:off x="0" y="0"/>
+          <a:ext cx="0" cy="0"/>
+          <a:chOff x="0" y="0"/>
+          <a:chExt cx="0" cy="0"/>
+        </a:xfrm>
+      </p:grpSpPr>
+      <p:sp>
+        <p:nvSpPr>
+          <p:cNvPr id="2" name="Title 1">
+            <a:extLst>
+              <a:ext uri="{FF2B5EF4-FFF2-40B4-BE49-F238E27FC236}">
+                <a16:creationId xmlns:a16="http://schemas.microsoft.com/office/drawing/2014/main" id="{28306E04-F502-C974-565B-0C0424EF0E21}"/>
+              </a:ext>
+            </a:extLst>
+          </p:cNvPr>
+          <p:cNvSpPr>
+            <a:spLocks noGrp="1"/>
+          </p:cNvSpPr>
+          <p:nvPr>
+            <p:ph type="title"/>
+          </p:nvPr>
+        </p:nvSpPr>
+        <p:spPr/>
+        <p:txBody>
+          <a:bodyPr/>
+          <a:lstStyle/>
+          <a:p>
+            <a:r>
+              <a:rPr lang="en-US" dirty="0"/>
+              <a:t>Fitting the model to the data – Before Oversampling</a:t>
+            </a:r>
+          </a:p>
+        </p:txBody>
+      </p:sp>
+      <p:pic>
+        <p:nvPicPr>
+          <p:cNvPr id="6" name="Content Placeholder 5">
+            <a:extLst>
+              <a:ext uri="{FF2B5EF4-FFF2-40B4-BE49-F238E27FC236}">
+                <a16:creationId xmlns:a16="http://schemas.microsoft.com/office/drawing/2014/main" id="{264B0D1F-A57B-0B1E-C7EC-DB073136F645}"/>
+              </a:ext>
+            </a:extLst>
+          </p:cNvPr>
+          <p:cNvPicPr>
+            <a:picLocks noGrp="1" noChangeAspect="1"/>
+          </p:cNvPicPr>
+          <p:nvPr>
+            <p:ph idx="1"/>
+          </p:nvPr>
+        </p:nvPicPr>
+        <p:blipFill>
+          <a:blip r:embed="rId2">
+            <a:extLst>
+              <a:ext uri="{28A0092B-C50C-407E-A947-70E740481C1C}">
+                <a14:useLocalDpi xmlns:a14="http://schemas.microsoft.com/office/drawing/2010/main" val="0"/>
+              </a:ext>
+            </a:extLst>
+          </a:blip>
+          <a:stretch>
+            <a:fillRect/>
+          </a:stretch>
+        </p:blipFill>
+        <p:spPr>
+          <a:xfrm>
+            <a:off x="1695556" y="2281490"/>
+            <a:ext cx="8800887" cy="3482366"/>
+          </a:xfrm>
+        </p:spPr>
+      </p:pic>
+      <p:sp>
+        <p:nvSpPr>
+          <p:cNvPr id="4" name="Slide Number Placeholder 3">
+            <a:extLst>
+              <a:ext uri="{FF2B5EF4-FFF2-40B4-BE49-F238E27FC236}">
+                <a16:creationId xmlns:a16="http://schemas.microsoft.com/office/drawing/2014/main" id="{103E2B65-574F-1FBC-A7D5-5E1AEF4C6679}"/>
+              </a:ext>
+            </a:extLst>
+          </p:cNvPr>
+          <p:cNvSpPr>
+            <a:spLocks noGrp="1"/>
+          </p:cNvSpPr>
+          <p:nvPr>
+            <p:ph type="sldNum" sz="quarter" idx="12"/>
+          </p:nvPr>
+        </p:nvSpPr>
+        <p:spPr/>
+        <p:txBody>
+          <a:bodyPr/>
+          <a:lstStyle/>
+          <a:p>
+            <a:fld id="{F56AC8B8-03BA-4745-994C-072AEE7EB195}" type="slidenum">
+              <a:rPr lang="en-US" smtClean="0"/>
+              <a:t>25</a:t>
+            </a:fld>
+            <a:endParaRPr lang="en-US"/>
+          </a:p>
+        </p:txBody>
+      </p:sp>
+    </p:spTree>
+    <p:extLst>
+      <p:ext uri="{BB962C8B-B14F-4D97-AF65-F5344CB8AC3E}">
+        <p14:creationId xmlns:p14="http://schemas.microsoft.com/office/powerpoint/2010/main" val="3686696775"/>
+      </p:ext>
+    </p:extLst>
+  </p:cSld>
+  <p:clrMapOvr>
+    <a:masterClrMapping/>
+  </p:clrMapOvr>
+</p:sld>
+</file>
+
+<file path=ppt/slides/slide26.xml><?xml version="1.0" encoding="utf-8"?>
+<p:sld xmlns:a="http://schemas.openxmlformats.org/drawingml/2006/main" xmlns:r="http://schemas.openxmlformats.org/officeDocument/2006/relationships" xmlns:p="http://schemas.openxmlformats.org/presentationml/2006/main">
+  <p:cSld>
+    <p:spTree>
+      <p:nvGrpSpPr>
+        <p:cNvPr id="1" name=""/>
+        <p:cNvGrpSpPr/>
+        <p:nvPr/>
+      </p:nvGrpSpPr>
+      <p:grpSpPr>
+        <a:xfrm>
+          <a:off x="0" y="0"/>
+          <a:ext cx="0" cy="0"/>
+          <a:chOff x="0" y="0"/>
+          <a:chExt cx="0" cy="0"/>
+        </a:xfrm>
+      </p:grpSpPr>
+      <p:sp>
+        <p:nvSpPr>
+          <p:cNvPr id="2" name="Title 1">
+            <a:extLst>
+              <a:ext uri="{FF2B5EF4-FFF2-40B4-BE49-F238E27FC236}">
+                <a16:creationId xmlns:a16="http://schemas.microsoft.com/office/drawing/2014/main" id="{28306E04-F502-C974-565B-0C0424EF0E21}"/>
+              </a:ext>
+            </a:extLst>
+          </p:cNvPr>
+          <p:cNvSpPr>
+            <a:spLocks noGrp="1"/>
+          </p:cNvSpPr>
+          <p:nvPr>
+            <p:ph type="title"/>
+          </p:nvPr>
+        </p:nvSpPr>
+        <p:spPr/>
+        <p:txBody>
+          <a:bodyPr/>
+          <a:lstStyle/>
+          <a:p>
+            <a:r>
+              <a:rPr lang="en-US" dirty="0"/>
+              <a:t>Fitting the model to the data – After Oversampling (half of majority class)</a:t>
+            </a:r>
+          </a:p>
+        </p:txBody>
+      </p:sp>
+      <p:sp>
+        <p:nvSpPr>
+          <p:cNvPr id="4" name="Slide Number Placeholder 3">
+            <a:extLst>
+              <a:ext uri="{FF2B5EF4-FFF2-40B4-BE49-F238E27FC236}">
+                <a16:creationId xmlns:a16="http://schemas.microsoft.com/office/drawing/2014/main" id="{103E2B65-574F-1FBC-A7D5-5E1AEF4C6679}"/>
+              </a:ext>
+            </a:extLst>
+          </p:cNvPr>
+          <p:cNvSpPr>
+            <a:spLocks noGrp="1"/>
+          </p:cNvSpPr>
+          <p:nvPr>
+            <p:ph type="sldNum" sz="quarter" idx="12"/>
+          </p:nvPr>
+        </p:nvSpPr>
+        <p:spPr/>
+        <p:txBody>
+          <a:bodyPr/>
+          <a:lstStyle/>
+          <a:p>
+            <a:fld id="{F56AC8B8-03BA-4745-994C-072AEE7EB195}" type="slidenum">
+              <a:rPr lang="en-US" smtClean="0"/>
+              <a:t>26</a:t>
+            </a:fld>
+            <a:endParaRPr lang="en-US"/>
+          </a:p>
+        </p:txBody>
+      </p:sp>
+      <p:pic>
+        <p:nvPicPr>
+          <p:cNvPr id="8" name="Content Placeholder 7">
+            <a:extLst>
+              <a:ext uri="{FF2B5EF4-FFF2-40B4-BE49-F238E27FC236}">
+                <a16:creationId xmlns:a16="http://schemas.microsoft.com/office/drawing/2014/main" id="{A4FDABD7-B34E-F5D3-F37A-97DC0454C8F7}"/>
+              </a:ext>
+            </a:extLst>
+          </p:cNvPr>
+          <p:cNvPicPr>
+            <a:picLocks noGrp="1" noChangeAspect="1"/>
+          </p:cNvPicPr>
+          <p:nvPr>
+            <p:ph idx="1"/>
+          </p:nvPr>
+        </p:nvPicPr>
+        <p:blipFill>
+          <a:blip r:embed="rId2">
+            <a:extLst>
+              <a:ext uri="{28A0092B-C50C-407E-A947-70E740481C1C}">
+                <a14:useLocalDpi xmlns:a14="http://schemas.microsoft.com/office/drawing/2010/main" val="0"/>
+              </a:ext>
+            </a:extLst>
+          </a:blip>
+          <a:stretch>
+            <a:fillRect/>
+          </a:stretch>
+        </p:blipFill>
+        <p:spPr>
+          <a:xfrm>
+            <a:off x="1686281" y="1825625"/>
+            <a:ext cx="8819438" cy="4351338"/>
+          </a:xfrm>
+        </p:spPr>
+      </p:pic>
+    </p:spTree>
+    <p:extLst>
+      <p:ext uri="{BB962C8B-B14F-4D97-AF65-F5344CB8AC3E}">
+        <p14:creationId xmlns:p14="http://schemas.microsoft.com/office/powerpoint/2010/main" val="312899189"/>
+      </p:ext>
+    </p:extLst>
+  </p:cSld>
+  <p:clrMapOvr>
+    <a:masterClrMapping/>
+  </p:clrMapOvr>
+</p:sld>
+</file>
+
+<file path=ppt/slides/slide27.xml><?xml version="1.0" encoding="utf-8"?>
+<p:sld xmlns:a="http://schemas.openxmlformats.org/drawingml/2006/main" xmlns:r="http://schemas.openxmlformats.org/officeDocument/2006/relationships" xmlns:p="http://schemas.openxmlformats.org/presentationml/2006/main">
+  <p:cSld>
+    <p:spTree>
+      <p:nvGrpSpPr>
+        <p:cNvPr id="1" name=""/>
+        <p:cNvGrpSpPr/>
+        <p:nvPr/>
+      </p:nvGrpSpPr>
+      <p:grpSpPr>
+        <a:xfrm>
+          <a:off x="0" y="0"/>
+          <a:ext cx="0" cy="0"/>
+          <a:chOff x="0" y="0"/>
+          <a:chExt cx="0" cy="0"/>
+        </a:xfrm>
+      </p:grpSpPr>
+      <p:sp>
+        <p:nvSpPr>
+          <p:cNvPr id="2" name="Title 1">
+            <a:extLst>
+              <a:ext uri="{FF2B5EF4-FFF2-40B4-BE49-F238E27FC236}">
+                <a16:creationId xmlns:a16="http://schemas.microsoft.com/office/drawing/2014/main" id="{28306E04-F502-C974-565B-0C0424EF0E21}"/>
+              </a:ext>
+            </a:extLst>
+          </p:cNvPr>
+          <p:cNvSpPr>
+            <a:spLocks noGrp="1"/>
+          </p:cNvSpPr>
+          <p:nvPr>
+            <p:ph type="title"/>
+          </p:nvPr>
+        </p:nvSpPr>
+        <p:spPr/>
+        <p:txBody>
+          <a:bodyPr/>
+          <a:lstStyle/>
+          <a:p>
+            <a:r>
+              <a:rPr lang="en-US" dirty="0"/>
+              <a:t>Fitting the model to the data – After Oversampling (equal to majority class)</a:t>
+            </a:r>
+          </a:p>
+        </p:txBody>
+      </p:sp>
+      <p:sp>
+        <p:nvSpPr>
+          <p:cNvPr id="4" name="Slide Number Placeholder 3">
+            <a:extLst>
+              <a:ext uri="{FF2B5EF4-FFF2-40B4-BE49-F238E27FC236}">
+                <a16:creationId xmlns:a16="http://schemas.microsoft.com/office/drawing/2014/main" id="{103E2B65-574F-1FBC-A7D5-5E1AEF4C6679}"/>
+              </a:ext>
+            </a:extLst>
+          </p:cNvPr>
+          <p:cNvSpPr>
+            <a:spLocks noGrp="1"/>
+          </p:cNvSpPr>
+          <p:nvPr>
+            <p:ph type="sldNum" sz="quarter" idx="12"/>
+          </p:nvPr>
+        </p:nvSpPr>
+        <p:spPr/>
+        <p:txBody>
+          <a:bodyPr/>
+          <a:lstStyle/>
+          <a:p>
+            <a:fld id="{F56AC8B8-03BA-4745-994C-072AEE7EB195}" type="slidenum">
+              <a:rPr lang="en-US" smtClean="0"/>
+              <a:t>27</a:t>
+            </a:fld>
+            <a:endParaRPr lang="en-US"/>
+          </a:p>
+        </p:txBody>
+      </p:sp>
+      <p:pic>
+        <p:nvPicPr>
+          <p:cNvPr id="8" name="Content Placeholder 7">
+            <a:extLst>
+              <a:ext uri="{FF2B5EF4-FFF2-40B4-BE49-F238E27FC236}">
+                <a16:creationId xmlns:a16="http://schemas.microsoft.com/office/drawing/2014/main" id="{27841F0E-BD76-59F5-25C1-C99FBB41C64D}"/>
+              </a:ext>
+            </a:extLst>
+          </p:cNvPr>
+          <p:cNvPicPr>
+            <a:picLocks noGrp="1" noChangeAspect="1"/>
+          </p:cNvPicPr>
+          <p:nvPr>
+            <p:ph idx="1"/>
+          </p:nvPr>
+        </p:nvPicPr>
+        <p:blipFill>
+          <a:blip r:embed="rId2">
+            <a:extLst>
+              <a:ext uri="{28A0092B-C50C-407E-A947-70E740481C1C}">
+                <a14:useLocalDpi xmlns:a14="http://schemas.microsoft.com/office/drawing/2010/main" val="0"/>
+              </a:ext>
+            </a:extLst>
+          </a:blip>
+          <a:stretch>
+            <a:fillRect/>
+          </a:stretch>
+        </p:blipFill>
+        <p:spPr>
+          <a:xfrm>
+            <a:off x="1040245" y="1825625"/>
+            <a:ext cx="10111510" cy="4351338"/>
+          </a:xfrm>
+        </p:spPr>
+      </p:pic>
+    </p:spTree>
+    <p:extLst>
+      <p:ext uri="{BB962C8B-B14F-4D97-AF65-F5344CB8AC3E}">
+        <p14:creationId xmlns:p14="http://schemas.microsoft.com/office/powerpoint/2010/main" val="1427407601"/>
+      </p:ext>
+    </p:extLst>
+  </p:cSld>
+  <p:clrMapOvr>
+    <a:masterClrMapping/>
+  </p:clrMapOvr>
+</p:sld>
+</file>
+
+<file path=ppt/slides/slide28.xml><?xml version="1.0" encoding="utf-8"?>
+<p:sld xmlns:a="http://schemas.openxmlformats.org/drawingml/2006/main" xmlns:r="http://schemas.openxmlformats.org/officeDocument/2006/relationships" xmlns:p="http://schemas.openxmlformats.org/presentationml/2006/main">
+  <p:cSld>
+    <p:spTree>
+      <p:nvGrpSpPr>
+        <p:cNvPr id="1" name=""/>
+        <p:cNvGrpSpPr/>
+        <p:nvPr/>
+      </p:nvGrpSpPr>
+      <p:grpSpPr>
+        <a:xfrm>
+          <a:off x="0" y="0"/>
+          <a:ext cx="0" cy="0"/>
+          <a:chOff x="0" y="0"/>
+          <a:chExt cx="0" cy="0"/>
+        </a:xfrm>
+      </p:grpSpPr>
+      <p:sp>
+        <p:nvSpPr>
+          <p:cNvPr id="2" name="Title 1">
+            <a:extLst>
+              <a:ext uri="{FF2B5EF4-FFF2-40B4-BE49-F238E27FC236}">
+                <a16:creationId xmlns:a16="http://schemas.microsoft.com/office/drawing/2014/main" id="{BD813C4F-E389-0FC5-5E77-33D1D27B4D3B}"/>
+              </a:ext>
+            </a:extLst>
+          </p:cNvPr>
+          <p:cNvSpPr>
+            <a:spLocks noGrp="1"/>
+          </p:cNvSpPr>
+          <p:nvPr>
+            <p:ph type="title"/>
+          </p:nvPr>
+        </p:nvSpPr>
+        <p:spPr/>
+        <p:txBody>
+          <a:bodyPr/>
+          <a:lstStyle/>
+          <a:p>
+            <a:r>
+              <a:rPr lang="en-US" dirty="0"/>
+              <a:t>Conclusions </a:t>
+            </a:r>
+          </a:p>
+        </p:txBody>
+      </p:sp>
+      <p:sp>
+        <p:nvSpPr>
+          <p:cNvPr id="3" name="Content Placeholder 2">
+            <a:extLst>
+              <a:ext uri="{FF2B5EF4-FFF2-40B4-BE49-F238E27FC236}">
+                <a16:creationId xmlns:a16="http://schemas.microsoft.com/office/drawing/2014/main" id="{CAFBCEF9-C35F-5DCA-D60C-DF469FFEC4A4}"/>
+              </a:ext>
+            </a:extLst>
+          </p:cNvPr>
+          <p:cNvSpPr>
+            <a:spLocks noGrp="1"/>
+          </p:cNvSpPr>
+          <p:nvPr>
+            <p:ph idx="1"/>
+          </p:nvPr>
+        </p:nvSpPr>
+        <p:spPr/>
+        <p:txBody>
+          <a:bodyPr/>
+          <a:lstStyle/>
+          <a:p>
+            <a:r>
+              <a:rPr lang="en-US" dirty="0">
+                <a:highlight>
+                  <a:srgbClr val="FFFF00"/>
+                </a:highlight>
+              </a:rPr>
+              <a:t>Summarize your conclusions </a:t>
+            </a:r>
+          </a:p>
+          <a:p>
+            <a:r>
+              <a:rPr lang="en-US" dirty="0">
+                <a:highlight>
+                  <a:srgbClr val="FFFF00"/>
+                </a:highlight>
+              </a:rPr>
+              <a:t>Only one slide </a:t>
+            </a:r>
+          </a:p>
+        </p:txBody>
+      </p:sp>
+      <p:sp>
+        <p:nvSpPr>
+          <p:cNvPr id="4" name="Slide Number Placeholder 3">
+            <a:extLst>
+              <a:ext uri="{FF2B5EF4-FFF2-40B4-BE49-F238E27FC236}">
+                <a16:creationId xmlns:a16="http://schemas.microsoft.com/office/drawing/2014/main" id="{9DB16714-064C-5A95-F5A4-61CE61A414AD}"/>
+              </a:ext>
+            </a:extLst>
+          </p:cNvPr>
+          <p:cNvSpPr>
+            <a:spLocks noGrp="1"/>
+          </p:cNvSpPr>
+          <p:nvPr>
+            <p:ph type="sldNum" sz="quarter" idx="12"/>
+          </p:nvPr>
+        </p:nvSpPr>
+        <p:spPr/>
+        <p:txBody>
+          <a:bodyPr/>
+          <a:lstStyle/>
+          <a:p>
+            <a:fld id="{F56AC8B8-03BA-4745-994C-072AEE7EB195}" type="slidenum">
+              <a:rPr lang="en-US" smtClean="0"/>
+              <a:t>28</a:t>
+            </a:fld>
+            <a:endParaRPr lang="en-US"/>
+          </a:p>
+        </p:txBody>
+      </p:sp>
+    </p:spTree>
+    <p:extLst>
+      <p:ext uri="{BB962C8B-B14F-4D97-AF65-F5344CB8AC3E}">
+        <p14:creationId xmlns:p14="http://schemas.microsoft.com/office/powerpoint/2010/main" val="4147814722"/>
+      </p:ext>
+    </p:extLst>
+  </p:cSld>
+  <p:clrMapOvr>
+    <a:masterClrMapping/>
+  </p:clrMapOvr>
+</p:sld>
+</file>
+
+<file path=ppt/slides/slide29.xml><?xml version="1.0" encoding="utf-8"?>
+<p:sld xmlns:a="http://schemas.openxmlformats.org/drawingml/2006/main" xmlns:r="http://schemas.openxmlformats.org/officeDocument/2006/relationships" xmlns:p="http://schemas.openxmlformats.org/presentationml/2006/main">
+  <p:cSld>
+    <p:spTree>
+      <p:nvGrpSpPr>
+        <p:cNvPr id="1" name=""/>
+        <p:cNvGrpSpPr/>
+        <p:nvPr/>
+      </p:nvGrpSpPr>
+      <p:grpSpPr>
+        <a:xfrm>
+          <a:off x="0" y="0"/>
+          <a:ext cx="0" cy="0"/>
+          <a:chOff x="0" y="0"/>
+          <a:chExt cx="0" cy="0"/>
+        </a:xfrm>
+      </p:grpSpPr>
+      <p:sp>
+        <p:nvSpPr>
+          <p:cNvPr id="2" name="Title 1">
+            <a:extLst>
+              <a:ext uri="{FF2B5EF4-FFF2-40B4-BE49-F238E27FC236}">
+                <a16:creationId xmlns:a16="http://schemas.microsoft.com/office/drawing/2014/main" id="{BD813C4F-E389-0FC5-5E77-33D1D27B4D3B}"/>
+              </a:ext>
+            </a:extLst>
+          </p:cNvPr>
+          <p:cNvSpPr>
+            <a:spLocks noGrp="1"/>
+          </p:cNvSpPr>
+          <p:nvPr>
+            <p:ph type="title"/>
+          </p:nvPr>
+        </p:nvSpPr>
+        <p:spPr/>
+        <p:txBody>
+          <a:bodyPr/>
+          <a:lstStyle/>
+          <a:p>
+            <a:r>
+              <a:rPr lang="en-US" dirty="0"/>
+              <a:t>Conclusions </a:t>
+            </a:r>
+          </a:p>
+        </p:txBody>
+      </p:sp>
+      <p:sp>
+        <p:nvSpPr>
+          <p:cNvPr id="3" name="Content Placeholder 2">
+            <a:extLst>
+              <a:ext uri="{FF2B5EF4-FFF2-40B4-BE49-F238E27FC236}">
+                <a16:creationId xmlns:a16="http://schemas.microsoft.com/office/drawing/2014/main" id="{CAFBCEF9-C35F-5DCA-D60C-DF469FFEC4A4}"/>
+              </a:ext>
+            </a:extLst>
+          </p:cNvPr>
+          <p:cNvSpPr>
+            <a:spLocks noGrp="1"/>
+          </p:cNvSpPr>
+          <p:nvPr>
+            <p:ph idx="1"/>
+          </p:nvPr>
+        </p:nvSpPr>
+        <p:spPr/>
+        <p:txBody>
+          <a:bodyPr/>
+          <a:lstStyle/>
+          <a:p>
+            <a:r>
+              <a:rPr lang="en-US" dirty="0"/>
+              <a:t>After all, We have obtained a model that have the least MAE(Mean Absolute Error) of about 0.025 which is very good after using the oversampling the minority class to be equal to the majority class due to the imbalance of our data.</a:t>
+            </a:r>
+          </a:p>
+        </p:txBody>
+      </p:sp>
+      <p:sp>
+        <p:nvSpPr>
+          <p:cNvPr id="4" name="Slide Number Placeholder 3">
+            <a:extLst>
+              <a:ext uri="{FF2B5EF4-FFF2-40B4-BE49-F238E27FC236}">
+                <a16:creationId xmlns:a16="http://schemas.microsoft.com/office/drawing/2014/main" id="{9DB16714-064C-5A95-F5A4-61CE61A414AD}"/>
+              </a:ext>
+            </a:extLst>
+          </p:cNvPr>
+          <p:cNvSpPr>
+            <a:spLocks noGrp="1"/>
+          </p:cNvSpPr>
+          <p:nvPr>
+            <p:ph type="sldNum" sz="quarter" idx="12"/>
+          </p:nvPr>
+        </p:nvSpPr>
+        <p:spPr/>
+        <p:txBody>
+          <a:bodyPr/>
+          <a:lstStyle/>
+          <a:p>
+            <a:fld id="{F56AC8B8-03BA-4745-994C-072AEE7EB195}" type="slidenum">
+              <a:rPr lang="en-US" smtClean="0"/>
+              <a:t>29</a:t>
+            </a:fld>
+            <a:endParaRPr lang="en-US"/>
+          </a:p>
+        </p:txBody>
+      </p:sp>
+    </p:spTree>
+    <p:extLst>
+      <p:ext uri="{BB962C8B-B14F-4D97-AF65-F5344CB8AC3E}">
+        <p14:creationId xmlns:p14="http://schemas.microsoft.com/office/powerpoint/2010/main" val="903610429"/>
+      </p:ext>
+    </p:extLst>
+  </p:cSld>
+  <p:clrMapOvr>
+    <a:masterClrMapping/>
+  </p:clrMapOvr>
+</p:sld>
+</file>
+
+<file path=ppt/slides/slide3.xml><?xml version="1.0" encoding="utf-8"?>
+<p:sld xmlns:a="http://schemas.openxmlformats.org/drawingml/2006/main" xmlns:r="http://schemas.openxmlformats.org/officeDocument/2006/relationships" xmlns:p="http://schemas.openxmlformats.org/presentationml/2006/main">
+  <p:cSld>
+    <p:spTree>
+      <p:nvGrpSpPr>
+        <p:cNvPr id="1" name=""/>
+        <p:cNvGrpSpPr/>
+        <p:nvPr/>
+      </p:nvGrpSpPr>
+      <p:grpSpPr>
+        <a:xfrm>
+          <a:off x="0" y="0"/>
+          <a:ext cx="0" cy="0"/>
+          <a:chOff x="0" y="0"/>
+          <a:chExt cx="0" cy="0"/>
+        </a:xfrm>
+      </p:grpSpPr>
+      <p:sp>
+        <p:nvSpPr>
+          <p:cNvPr id="2" name="Title 1">
+            <a:extLst>
+              <a:ext uri="{FF2B5EF4-FFF2-40B4-BE49-F238E27FC236}">
+                <a16:creationId xmlns:a16="http://schemas.microsoft.com/office/drawing/2014/main" id="{43EE6C72-03D5-F7F0-1189-4C7BA75BAA61}"/>
+              </a:ext>
+            </a:extLst>
+          </p:cNvPr>
+          <p:cNvSpPr>
+            <a:spLocks noGrp="1"/>
+          </p:cNvSpPr>
+          <p:nvPr>
+            <p:ph type="title"/>
+          </p:nvPr>
+        </p:nvSpPr>
+        <p:spPr/>
+        <p:txBody>
+          <a:bodyPr/>
+          <a:lstStyle/>
+          <a:p>
+            <a:r>
+              <a:rPr lang="en-US" dirty="0"/>
+              <a:t>About the domain</a:t>
+            </a:r>
+          </a:p>
+        </p:txBody>
+      </p:sp>
+      <p:sp>
+        <p:nvSpPr>
+          <p:cNvPr id="3" name="Content Placeholder 2">
+            <a:extLst>
+              <a:ext uri="{FF2B5EF4-FFF2-40B4-BE49-F238E27FC236}">
+                <a16:creationId xmlns:a16="http://schemas.microsoft.com/office/drawing/2014/main" id="{2CAC2674-75A1-6757-F8C2-5CD61FD6D8AE}"/>
+              </a:ext>
+            </a:extLst>
+          </p:cNvPr>
+          <p:cNvSpPr>
+            <a:spLocks noGrp="1"/>
+          </p:cNvSpPr>
+          <p:nvPr>
+            <p:ph idx="1"/>
+          </p:nvPr>
+        </p:nvSpPr>
+        <p:spPr/>
+        <p:txBody>
+          <a:bodyPr/>
+          <a:lstStyle/>
+          <a:p>
+            <a:r>
+              <a:rPr lang="en-US" b="0" i="0" dirty="0">
+                <a:effectLst/>
+              </a:rPr>
+              <a:t>The domain as the name suggests talks about detecting the oil-spill regions of the ocean, some of which contain an oil spill and some that do not.</a:t>
+            </a:r>
+          </a:p>
+          <a:p>
+            <a:r>
+              <a:rPr lang="en-US" b="0" i="0" dirty="0">
+                <a:effectLst/>
+              </a:rPr>
+              <a:t>Images taken through “Satellite Radar Images” were split into sections and processed using computer vision algorithms to provide a vector of features to describe the contents of the image section or patch.</a:t>
+            </a:r>
+          </a:p>
+          <a:p>
+            <a:r>
+              <a:rPr lang="en-US" b="0" i="0" dirty="0">
+                <a:effectLst/>
+              </a:rPr>
+              <a:t>There are 937 cases. Each case is comprised of 48 numerical computer vision derived features, a patch number, and a class label.</a:t>
+            </a:r>
+          </a:p>
+        </p:txBody>
+      </p:sp>
+      <p:sp>
+        <p:nvSpPr>
+          <p:cNvPr id="4" name="Slide Number Placeholder 3">
+            <a:extLst>
+              <a:ext uri="{FF2B5EF4-FFF2-40B4-BE49-F238E27FC236}">
+                <a16:creationId xmlns:a16="http://schemas.microsoft.com/office/drawing/2014/main" id="{13D1065C-0B23-6D9D-4687-807AC2FDE565}"/>
+              </a:ext>
+            </a:extLst>
+          </p:cNvPr>
+          <p:cNvSpPr>
+            <a:spLocks noGrp="1"/>
+          </p:cNvSpPr>
+          <p:nvPr>
+            <p:ph type="sldNum" sz="quarter" idx="12"/>
+          </p:nvPr>
+        </p:nvSpPr>
+        <p:spPr/>
+        <p:txBody>
+          <a:bodyPr/>
+          <a:lstStyle/>
+          <a:p>
+            <a:fld id="{F56AC8B8-03BA-4745-994C-072AEE7EB195}" type="slidenum">
+              <a:rPr lang="en-US" smtClean="0"/>
+              <a:t>3</a:t>
+            </a:fld>
+            <a:endParaRPr lang="en-US"/>
+          </a:p>
+        </p:txBody>
+      </p:sp>
+    </p:spTree>
+    <p:extLst>
+      <p:ext uri="{BB962C8B-B14F-4D97-AF65-F5344CB8AC3E}">
+        <p14:creationId xmlns:p14="http://schemas.microsoft.com/office/powerpoint/2010/main" val="3756280653"/>
+      </p:ext>
+    </p:extLst>
+  </p:cSld>
+  <p:clrMapOvr>
+    <a:masterClrMapping/>
+  </p:clrMapOvr>
+</p:sld>
+</file>
+
+<file path=ppt/slides/slide30.xml><?xml version="1.0" encoding="utf-8"?>
+<p:sld xmlns:a="http://schemas.openxmlformats.org/drawingml/2006/main" xmlns:r="http://schemas.openxmlformats.org/officeDocument/2006/relationships" xmlns:p="http://schemas.openxmlformats.org/presentationml/2006/main">
+  <p:cSld>
+    <p:spTree>
+      <p:nvGrpSpPr>
+        <p:cNvPr id="1" name=""/>
+        <p:cNvGrpSpPr/>
+        <p:nvPr/>
+      </p:nvGrpSpPr>
+      <p:grpSpPr>
+        <a:xfrm>
+          <a:off x="0" y="0"/>
+          <a:ext cx="0" cy="0"/>
+          <a:chOff x="0" y="0"/>
+          <a:chExt cx="0" cy="0"/>
+        </a:xfrm>
+      </p:grpSpPr>
+      <p:sp>
+        <p:nvSpPr>
+          <p:cNvPr id="2" name="Title 1">
+            <a:extLst>
+              <a:ext uri="{FF2B5EF4-FFF2-40B4-BE49-F238E27FC236}">
+                <a16:creationId xmlns:a16="http://schemas.microsoft.com/office/drawing/2014/main" id="{CE4FC326-77E1-7C58-067E-4C0493CD0A8D}"/>
+              </a:ext>
+            </a:extLst>
+          </p:cNvPr>
+          <p:cNvSpPr>
+            <a:spLocks noGrp="1"/>
+          </p:cNvSpPr>
+          <p:nvPr>
+            <p:ph type="title"/>
+          </p:nvPr>
+        </p:nvSpPr>
+        <p:spPr>
+          <a:xfrm>
+            <a:off x="3541552" y="1157681"/>
+            <a:ext cx="3614257" cy="4538444"/>
+          </a:xfrm>
+        </p:spPr>
+        <p:txBody>
+          <a:bodyPr>
+            <a:noAutofit/>
+          </a:bodyPr>
+          <a:lstStyle/>
+          <a:p>
+            <a:r>
+              <a:rPr lang="en-US" sz="33600" dirty="0">
+                <a:solidFill>
+                  <a:srgbClr val="7030A0"/>
+                </a:solidFill>
+                <a:sym typeface="Wingdings" panose="05000000000000000000" pitchFamily="2" charset="2"/>
+              </a:rPr>
+              <a:t> </a:t>
+            </a:r>
+            <a:endParaRPr lang="en-US" sz="33600" dirty="0">
+              <a:solidFill>
+                <a:srgbClr val="7030A0"/>
+              </a:solidFill>
+            </a:endParaRPr>
+          </a:p>
+        </p:txBody>
+      </p:sp>
+      <p:sp>
+        <p:nvSpPr>
+          <p:cNvPr id="3" name="Slide Number Placeholder 2">
+            <a:extLst>
+              <a:ext uri="{FF2B5EF4-FFF2-40B4-BE49-F238E27FC236}">
+                <a16:creationId xmlns:a16="http://schemas.microsoft.com/office/drawing/2014/main" id="{14A2F5BC-4D35-7AE1-609A-9916E337CD69}"/>
+              </a:ext>
+            </a:extLst>
+          </p:cNvPr>
+          <p:cNvSpPr>
+            <a:spLocks noGrp="1"/>
+          </p:cNvSpPr>
+          <p:nvPr>
+            <p:ph type="sldNum" sz="quarter" idx="12"/>
+          </p:nvPr>
+        </p:nvSpPr>
+        <p:spPr/>
+        <p:txBody>
+          <a:bodyPr/>
+          <a:lstStyle/>
+          <a:p>
+            <a:fld id="{F56AC8B8-03BA-4745-994C-072AEE7EB195}" type="slidenum">
+              <a:rPr lang="en-US" smtClean="0"/>
+              <a:t>30</a:t>
+            </a:fld>
+            <a:endParaRPr lang="en-US"/>
+          </a:p>
+        </p:txBody>
+      </p:sp>
+    </p:spTree>
+    <p:extLst>
+      <p:ext uri="{BB962C8B-B14F-4D97-AF65-F5344CB8AC3E}">
+        <p14:creationId xmlns:p14="http://schemas.microsoft.com/office/powerpoint/2010/main" val="1496494060"/>
+      </p:ext>
+    </p:extLst>
+  </p:cSld>
+  <p:clrMapOvr>
+    <a:masterClrMapping/>
+  </p:clrMapOvr>
+</p:sld>
+</file>
+
+<file path=ppt/slides/slide4.xml><?xml version="1.0" encoding="utf-8"?>
+<p:sld xmlns:a="http://schemas.openxmlformats.org/drawingml/2006/main" xmlns:r="http://schemas.openxmlformats.org/officeDocument/2006/relationships" xmlns:p="http://schemas.openxmlformats.org/presentationml/2006/main">
+  <p:cSld>
+    <p:spTree>
+      <p:nvGrpSpPr>
+        <p:cNvPr id="1" name=""/>
+        <p:cNvGrpSpPr/>
+        <p:nvPr/>
+      </p:nvGrpSpPr>
+      <p:grpSpPr>
+        <a:xfrm>
+          <a:off x="0" y="0"/>
+          <a:ext cx="0" cy="0"/>
+          <a:chOff x="0" y="0"/>
+          <a:chExt cx="0" cy="0"/>
+        </a:xfrm>
+      </p:grpSpPr>
+      <p:sp>
+        <p:nvSpPr>
+          <p:cNvPr id="2" name="Title 1">
+            <a:extLst>
+              <a:ext uri="{FF2B5EF4-FFF2-40B4-BE49-F238E27FC236}">
+                <a16:creationId xmlns:a16="http://schemas.microsoft.com/office/drawing/2014/main" id="{43EE6C72-03D5-F7F0-1189-4C7BA75BAA61}"/>
+              </a:ext>
+            </a:extLst>
+          </p:cNvPr>
+          <p:cNvSpPr>
+            <a:spLocks noGrp="1"/>
+          </p:cNvSpPr>
+          <p:nvPr>
+            <p:ph type="title"/>
+          </p:nvPr>
+        </p:nvSpPr>
+        <p:spPr/>
+        <p:txBody>
+          <a:bodyPr/>
+          <a:lstStyle/>
+          <a:p>
+            <a:r>
+              <a:rPr lang="en-US" dirty="0"/>
+              <a:t>About the domain</a:t>
+            </a:r>
+          </a:p>
+        </p:txBody>
+      </p:sp>
+      <p:sp>
+        <p:nvSpPr>
+          <p:cNvPr id="3" name="Content Placeholder 2">
+            <a:extLst>
+              <a:ext uri="{FF2B5EF4-FFF2-40B4-BE49-F238E27FC236}">
+                <a16:creationId xmlns:a16="http://schemas.microsoft.com/office/drawing/2014/main" id="{2CAC2674-75A1-6757-F8C2-5CD61FD6D8AE}"/>
+              </a:ext>
+            </a:extLst>
+          </p:cNvPr>
+          <p:cNvSpPr>
+            <a:spLocks noGrp="1"/>
+          </p:cNvSpPr>
+          <p:nvPr>
+            <p:ph idx="1"/>
+          </p:nvPr>
+        </p:nvSpPr>
+        <p:spPr/>
+        <p:txBody>
+          <a:bodyPr>
+            <a:normAutofit/>
+          </a:bodyPr>
+          <a:lstStyle/>
+          <a:p>
+            <a:pPr algn="l" fontAlgn="base"/>
+            <a:r>
+              <a:rPr lang="en-US" b="0" i="0" dirty="0">
+                <a:effectLst/>
+              </a:rPr>
+              <a:t>There are two classes and the goal is to distinguish between spill and non-spill using the features for a given ocean patch.</a:t>
+            </a:r>
+          </a:p>
+          <a:p>
+            <a:pPr lvl="1" fontAlgn="base"/>
+            <a:r>
+              <a:rPr lang="en-US" sz="2800" b="0" i="0" dirty="0">
+                <a:effectLst/>
+              </a:rPr>
+              <a:t>Non-Spill: negative case, or majority class.</a:t>
+            </a:r>
+          </a:p>
+          <a:p>
+            <a:pPr lvl="1" fontAlgn="base"/>
+            <a:r>
+              <a:rPr lang="en-US" sz="2800" b="0" i="0" dirty="0">
+                <a:effectLst/>
+              </a:rPr>
+              <a:t>Oil Spill: positive case, or minority class.</a:t>
+            </a:r>
+          </a:p>
+        </p:txBody>
+      </p:sp>
+      <p:sp>
+        <p:nvSpPr>
+          <p:cNvPr id="4" name="Slide Number Placeholder 3">
+            <a:extLst>
+              <a:ext uri="{FF2B5EF4-FFF2-40B4-BE49-F238E27FC236}">
+                <a16:creationId xmlns:a16="http://schemas.microsoft.com/office/drawing/2014/main" id="{13D1065C-0B23-6D9D-4687-807AC2FDE565}"/>
+              </a:ext>
+            </a:extLst>
+          </p:cNvPr>
+          <p:cNvSpPr>
+            <a:spLocks noGrp="1"/>
+          </p:cNvSpPr>
+          <p:nvPr>
+            <p:ph type="sldNum" sz="quarter" idx="12"/>
+          </p:nvPr>
+        </p:nvSpPr>
+        <p:spPr/>
+        <p:txBody>
+          <a:bodyPr/>
+          <a:lstStyle/>
+          <a:p>
+            <a:fld id="{F56AC8B8-03BA-4745-994C-072AEE7EB195}" type="slidenum">
+              <a:rPr lang="en-US" smtClean="0"/>
+              <a:t>4</a:t>
+            </a:fld>
+            <a:endParaRPr lang="en-US"/>
+          </a:p>
+        </p:txBody>
+      </p:sp>
+    </p:spTree>
+    <p:extLst>
+      <p:ext uri="{BB962C8B-B14F-4D97-AF65-F5344CB8AC3E}">
+        <p14:creationId xmlns:p14="http://schemas.microsoft.com/office/powerpoint/2010/main" val="1670379701"/>
+      </p:ext>
+    </p:extLst>
+  </p:cSld>
+  <p:clrMapOvr>
+    <a:masterClrMapping/>
+  </p:clrMapOvr>
+</p:sld>
+</file>
+
+<file path=ppt/slides/slide5.xml><?xml version="1.0" encoding="utf-8"?>
+<p:sld xmlns:a="http://schemas.openxmlformats.org/drawingml/2006/main" xmlns:r="http://schemas.openxmlformats.org/officeDocument/2006/relationships" xmlns:p="http://schemas.openxmlformats.org/presentationml/2006/main">
+  <p:cSld>
+    <p:spTree>
+      <p:nvGrpSpPr>
+        <p:cNvPr id="1" name=""/>
+        <p:cNvGrpSpPr/>
+        <p:nvPr/>
+      </p:nvGrpSpPr>
+      <p:grpSpPr>
+        <a:xfrm>
+          <a:off x="0" y="0"/>
+          <a:ext cx="0" cy="0"/>
+          <a:chOff x="0" y="0"/>
+          <a:chExt cx="0" cy="0"/>
+        </a:xfrm>
+      </p:grpSpPr>
+      <p:sp>
+        <p:nvSpPr>
+          <p:cNvPr id="4" name="Title 3">
+            <a:extLst>
+              <a:ext uri="{FF2B5EF4-FFF2-40B4-BE49-F238E27FC236}">
+                <a16:creationId xmlns:a16="http://schemas.microsoft.com/office/drawing/2014/main" id="{A8348381-F94E-1E08-559A-B780DCA65C20}"/>
+              </a:ext>
+            </a:extLst>
+          </p:cNvPr>
+          <p:cNvSpPr>
+            <a:spLocks noGrp="1"/>
+          </p:cNvSpPr>
+          <p:nvPr>
+            <p:ph type="title"/>
+          </p:nvPr>
+        </p:nvSpPr>
+        <p:spPr/>
+        <p:txBody>
+          <a:bodyPr/>
+          <a:lstStyle/>
+          <a:p>
+            <a:r>
+              <a:rPr lang="en-US" dirty="0"/>
+              <a:t>About the data</a:t>
+            </a:r>
+          </a:p>
+        </p:txBody>
+      </p:sp>
+      <p:sp>
+        <p:nvSpPr>
+          <p:cNvPr id="2" name="Slide Number Placeholder 1">
+            <a:extLst>
+              <a:ext uri="{FF2B5EF4-FFF2-40B4-BE49-F238E27FC236}">
+                <a16:creationId xmlns:a16="http://schemas.microsoft.com/office/drawing/2014/main" id="{4F854354-C68F-8668-4886-D18DE3290A70}"/>
+              </a:ext>
+            </a:extLst>
+          </p:cNvPr>
+          <p:cNvSpPr>
+            <a:spLocks noGrp="1"/>
+          </p:cNvSpPr>
+          <p:nvPr>
+            <p:ph type="sldNum" sz="quarter" idx="12"/>
+          </p:nvPr>
+        </p:nvSpPr>
+        <p:spPr/>
+        <p:txBody>
+          <a:bodyPr/>
+          <a:lstStyle/>
+          <a:p>
+            <a:fld id="{F56AC8B8-03BA-4745-994C-072AEE7EB195}" type="slidenum">
+              <a:rPr lang="en-US" smtClean="0"/>
+              <a:t>5</a:t>
+            </a:fld>
+            <a:endParaRPr lang="en-US"/>
+          </a:p>
+        </p:txBody>
+      </p:sp>
+    </p:spTree>
+    <p:extLst>
+      <p:ext uri="{BB962C8B-B14F-4D97-AF65-F5344CB8AC3E}">
+        <p14:creationId xmlns:p14="http://schemas.microsoft.com/office/powerpoint/2010/main" val="2898937329"/>
+      </p:ext>
+    </p:extLst>
+  </p:cSld>
+  <p:clrMapOvr>
+    <a:masterClrMapping/>
+  </p:clrMapOvr>
+</p:sld>
+</file>
+
+<file path=ppt/slides/slide6.xml><?xml version="1.0" encoding="utf-8"?>
+<p:sld xmlns:a="http://schemas.openxmlformats.org/drawingml/2006/main" xmlns:r="http://schemas.openxmlformats.org/officeDocument/2006/relationships" xmlns:p="http://schemas.openxmlformats.org/presentationml/2006/main">
+  <p:cSld>
+    <p:spTree>
+      <p:nvGrpSpPr>
+        <p:cNvPr id="1" name=""/>
+        <p:cNvGrpSpPr/>
+        <p:nvPr/>
+      </p:nvGrpSpPr>
+      <p:grpSpPr>
+        <a:xfrm>
+          <a:off x="0" y="0"/>
+          <a:ext cx="0" cy="0"/>
+          <a:chOff x="0" y="0"/>
+          <a:chExt cx="0" cy="0"/>
+        </a:xfrm>
+      </p:grpSpPr>
+      <p:sp>
+        <p:nvSpPr>
+          <p:cNvPr id="2" name="Title 1">
+            <a:extLst>
+              <a:ext uri="{FF2B5EF4-FFF2-40B4-BE49-F238E27FC236}">
+                <a16:creationId xmlns:a16="http://schemas.microsoft.com/office/drawing/2014/main" id="{43EE6C72-03D5-F7F0-1189-4C7BA75BAA61}"/>
+              </a:ext>
+            </a:extLst>
+          </p:cNvPr>
+          <p:cNvSpPr>
+            <a:spLocks noGrp="1"/>
+          </p:cNvSpPr>
+          <p:nvPr>
+            <p:ph type="title"/>
+          </p:nvPr>
+        </p:nvSpPr>
+        <p:spPr/>
+        <p:txBody>
+          <a:bodyPr/>
+          <a:lstStyle/>
+          <a:p>
+            <a:r>
+              <a:rPr lang="en-US" dirty="0"/>
+              <a:t>About the data</a:t>
+            </a:r>
+          </a:p>
+        </p:txBody>
+      </p:sp>
+      <p:sp>
+        <p:nvSpPr>
+          <p:cNvPr id="4" name="Slide Number Placeholder 3">
+            <a:extLst>
+              <a:ext uri="{FF2B5EF4-FFF2-40B4-BE49-F238E27FC236}">
+                <a16:creationId xmlns:a16="http://schemas.microsoft.com/office/drawing/2014/main" id="{9EE1467D-13A7-BE50-EBBE-B4FE6C9FB6BF}"/>
+              </a:ext>
+            </a:extLst>
+          </p:cNvPr>
+          <p:cNvSpPr>
+            <a:spLocks noGrp="1"/>
+          </p:cNvSpPr>
+          <p:nvPr>
+            <p:ph type="sldNum" sz="quarter" idx="12"/>
+          </p:nvPr>
+        </p:nvSpPr>
+        <p:spPr/>
+        <p:txBody>
+          <a:bodyPr/>
+          <a:lstStyle/>
+          <a:p>
+            <a:fld id="{F56AC8B8-03BA-4745-994C-072AEE7EB195}" type="slidenum">
+              <a:rPr lang="en-US" smtClean="0"/>
+              <a:t>6</a:t>
+            </a:fld>
+            <a:endParaRPr lang="en-US"/>
+          </a:p>
+        </p:txBody>
+      </p:sp>
+      <p:sp>
+        <p:nvSpPr>
+          <p:cNvPr id="5" name="Content Placeholder 2">
+            <a:extLst>
+              <a:ext uri="{FF2B5EF4-FFF2-40B4-BE49-F238E27FC236}">
+                <a16:creationId xmlns:a16="http://schemas.microsoft.com/office/drawing/2014/main" id="{9DC1E399-0EC5-8330-298A-C1EE4B3B1522}"/>
+              </a:ext>
+            </a:extLst>
+          </p:cNvPr>
+          <p:cNvSpPr txBox="1">
+            <a:spLocks/>
+          </p:cNvSpPr>
+          <p:nvPr/>
+        </p:nvSpPr>
+        <p:spPr>
+          <a:xfrm>
+            <a:off x="838200" y="1690688"/>
+            <a:ext cx="10515600" cy="4351338"/>
+          </a:xfrm>
+          <a:prstGeom prst="rect">
+            <a:avLst/>
+          </a:prstGeom>
+        </p:spPr>
+        <p:txBody>
+          <a:bodyPr vert="horz" lIns="91440" tIns="45720" rIns="91440" bIns="45720" rtlCol="0">
+            <a:normAutofit/>
+          </a:bodyPr>
+          <a:lstStyle>
+            <a:lvl1pPr marL="228600" indent="-228600" algn="l" defTabSz="914400" rtl="0" eaLnBrk="1" latinLnBrk="0" hangingPunct="1">
+              <a:lnSpc>
+                <a:spcPct val="90000"/>
+              </a:lnSpc>
+              <a:spcBef>
+                <a:spcPts val="1000"/>
+              </a:spcBef>
+              <a:buFont typeface="Arial" panose="020B0604020202020204" pitchFamily="34" charset="0"/>
+              <a:buChar char="•"/>
+              <a:defRPr sz="2800" kern="1200">
+                <a:solidFill>
+                  <a:schemeClr val="tx1"/>
+                </a:solidFill>
+                <a:latin typeface="+mn-lt"/>
+                <a:ea typeface="+mn-ea"/>
+                <a:cs typeface="+mn-cs"/>
+              </a:defRPr>
+            </a:lvl1pPr>
+            <a:lvl2pPr marL="685800" indent="-228600" algn="l" defTabSz="914400" rtl="0" eaLnBrk="1" latinLnBrk="0" hangingPunct="1">
+              <a:lnSpc>
+                <a:spcPct val="90000"/>
+              </a:lnSpc>
+              <a:spcBef>
+                <a:spcPts val="500"/>
+              </a:spcBef>
+              <a:buFont typeface="Arial" panose="020B0604020202020204" pitchFamily="34" charset="0"/>
+              <a:buChar char="•"/>
+              <a:defRPr sz="2400" kern="1200">
+                <a:solidFill>
+                  <a:schemeClr val="tx1"/>
+                </a:solidFill>
+                <a:latin typeface="+mn-lt"/>
+                <a:ea typeface="+mn-ea"/>
+                <a:cs typeface="+mn-cs"/>
+              </a:defRPr>
+            </a:lvl2pPr>
+            <a:lvl3pPr marL="1143000" indent="-228600" algn="l" defTabSz="914400" rtl="0" eaLnBrk="1" latinLnBrk="0" hangingPunct="1">
+              <a:lnSpc>
+                <a:spcPct val="90000"/>
+              </a:lnSpc>
+              <a:spcBef>
+                <a:spcPts val="500"/>
+              </a:spcBef>
+              <a:buFont typeface="Arial" panose="020B0604020202020204" pitchFamily="34" charset="0"/>
+              <a:buChar char="•"/>
+              <a:defRPr sz="2000" kern="1200">
+                <a:solidFill>
+                  <a:schemeClr val="tx1"/>
+                </a:solidFill>
+                <a:latin typeface="+mn-lt"/>
+                <a:ea typeface="+mn-ea"/>
+                <a:cs typeface="+mn-cs"/>
+              </a:defRPr>
+            </a:lvl3pPr>
+            <a:lvl4pPr marL="1600200" indent="-228600" algn="l" defTabSz="914400" rtl="0" eaLnBrk="1" latinLnBrk="0" hangingPunct="1">
+              <a:lnSpc>
+                <a:spcPct val="90000"/>
+              </a:lnSpc>
+              <a:spcBef>
+                <a:spcPts val="500"/>
+              </a:spcBef>
+              <a:buFont typeface="Arial" panose="020B0604020202020204" pitchFamily="34" charset="0"/>
+              <a:buChar char="•"/>
+              <a:defRPr sz="1800" kern="1200">
+                <a:solidFill>
+                  <a:schemeClr val="tx1"/>
+                </a:solidFill>
+                <a:latin typeface="+mn-lt"/>
+                <a:ea typeface="+mn-ea"/>
+                <a:cs typeface="+mn-cs"/>
+              </a:defRPr>
+            </a:lvl4pPr>
+            <a:lvl5pPr marL="2057400" indent="-228600" algn="l" defTabSz="914400" rtl="0" eaLnBrk="1" latinLnBrk="0" hangingPunct="1">
+              <a:lnSpc>
+                <a:spcPct val="90000"/>
+              </a:lnSpc>
+              <a:spcBef>
+                <a:spcPts val="500"/>
+              </a:spcBef>
+              <a:buFont typeface="Arial" panose="020B0604020202020204" pitchFamily="34" charset="0"/>
+              <a:buChar char="•"/>
+              <a:defRPr sz="1800" kern="1200">
+                <a:solidFill>
+                  <a:schemeClr val="tx1"/>
+                </a:solidFill>
+                <a:latin typeface="+mn-lt"/>
+                <a:ea typeface="+mn-ea"/>
+                <a:cs typeface="+mn-cs"/>
+              </a:defRPr>
+            </a:lvl5pPr>
+            <a:lvl6pPr marL="2514600" indent="-228600" algn="l" defTabSz="914400" rtl="0" eaLnBrk="1" latinLnBrk="0" hangingPunct="1">
+              <a:lnSpc>
+                <a:spcPct val="90000"/>
+              </a:lnSpc>
+              <a:spcBef>
+                <a:spcPts val="500"/>
+              </a:spcBef>
+              <a:buFont typeface="Arial" panose="020B0604020202020204" pitchFamily="34" charset="0"/>
+              <a:buChar char="•"/>
+              <a:defRPr sz="1800" kern="1200">
+                <a:solidFill>
+                  <a:schemeClr val="tx1"/>
+                </a:solidFill>
+                <a:latin typeface="+mn-lt"/>
+                <a:ea typeface="+mn-ea"/>
+                <a:cs typeface="+mn-cs"/>
+              </a:defRPr>
+            </a:lvl6pPr>
+            <a:lvl7pPr marL="2971800" indent="-228600" algn="l" defTabSz="914400" rtl="0" eaLnBrk="1" latinLnBrk="0" hangingPunct="1">
+              <a:lnSpc>
+                <a:spcPct val="90000"/>
+              </a:lnSpc>
+              <a:spcBef>
+                <a:spcPts val="500"/>
+              </a:spcBef>
+              <a:buFont typeface="Arial" panose="020B0604020202020204" pitchFamily="34" charset="0"/>
+              <a:buChar char="•"/>
+              <a:defRPr sz="1800" kern="1200">
+                <a:solidFill>
+                  <a:schemeClr val="tx1"/>
+                </a:solidFill>
+                <a:latin typeface="+mn-lt"/>
+                <a:ea typeface="+mn-ea"/>
+                <a:cs typeface="+mn-cs"/>
+              </a:defRPr>
+            </a:lvl7pPr>
+            <a:lvl8pPr marL="3429000" indent="-228600" algn="l" defTabSz="914400" rtl="0" eaLnBrk="1" latinLnBrk="0" hangingPunct="1">
+              <a:lnSpc>
+                <a:spcPct val="90000"/>
+              </a:lnSpc>
+              <a:spcBef>
+                <a:spcPts val="500"/>
+              </a:spcBef>
+              <a:buFont typeface="Arial" panose="020B0604020202020204" pitchFamily="34" charset="0"/>
+              <a:buChar char="•"/>
+              <a:defRPr sz="1800" kern="1200">
+                <a:solidFill>
+                  <a:schemeClr val="tx1"/>
+                </a:solidFill>
+                <a:latin typeface="+mn-lt"/>
+                <a:ea typeface="+mn-ea"/>
+                <a:cs typeface="+mn-cs"/>
+              </a:defRPr>
+            </a:lvl8pPr>
+            <a:lvl9pPr marL="3886200" indent="-228600" algn="l" defTabSz="914400" rtl="0" eaLnBrk="1" latinLnBrk="0" hangingPunct="1">
+              <a:lnSpc>
+                <a:spcPct val="90000"/>
+              </a:lnSpc>
+              <a:spcBef>
+                <a:spcPts val="500"/>
+              </a:spcBef>
+              <a:buFont typeface="Arial" panose="020B0604020202020204" pitchFamily="34" charset="0"/>
+              <a:buChar char="•"/>
+              <a:defRPr sz="1800" kern="1200">
+                <a:solidFill>
+                  <a:schemeClr val="tx1"/>
+                </a:solidFill>
+                <a:latin typeface="+mn-lt"/>
+                <a:ea typeface="+mn-ea"/>
+                <a:cs typeface="+mn-cs"/>
+              </a:defRPr>
+            </a:lvl9pPr>
+          </a:lstStyle>
+          <a:p>
+            <a:r>
+              <a:rPr lang="en-US" dirty="0"/>
+              <a:t>The dataset was developed by starting with satellite images of the ocean, some of which contain an oil spill and some that do not.</a:t>
+            </a:r>
+          </a:p>
+          <a:p>
+            <a:r>
+              <a:rPr lang="en-US" dirty="0"/>
+              <a:t>Images were split into sections and processed using computer vision algorithms to provide a vector of features to describe the contents of the image section or patch.</a:t>
+            </a:r>
+          </a:p>
+          <a:p>
+            <a:r>
+              <a:rPr lang="en-US" dirty="0"/>
+              <a:t>The task is, given a vector that describes the contents of a patch of a satellite image, then predicts whether the patch contains an oil spill or not, e.g. from the illegal or accidental dumping of oil in the ocean.</a:t>
+            </a:r>
+          </a:p>
+        </p:txBody>
+      </p:sp>
+    </p:spTree>
+    <p:extLst>
+      <p:ext uri="{BB962C8B-B14F-4D97-AF65-F5344CB8AC3E}">
+        <p14:creationId xmlns:p14="http://schemas.microsoft.com/office/powerpoint/2010/main" val="1589616354"/>
+      </p:ext>
+    </p:extLst>
+  </p:cSld>
+  <p:clrMapOvr>
+    <a:masterClrMapping/>
+  </p:clrMapOvr>
+</p:sld>
+</file>
+
+<file path=ppt/slides/slide7.xml><?xml version="1.0" encoding="utf-8"?>
+<p:sld xmlns:a="http://schemas.openxmlformats.org/drawingml/2006/main" xmlns:r="http://schemas.openxmlformats.org/officeDocument/2006/relationships" xmlns:p="http://schemas.openxmlformats.org/presentationml/2006/main">
+  <p:cSld>
+    <p:spTree>
+      <p:nvGrpSpPr>
+        <p:cNvPr id="1" name=""/>
+        <p:cNvGrpSpPr/>
+        <p:nvPr/>
+      </p:nvGrpSpPr>
+      <p:grpSpPr>
+        <a:xfrm>
+          <a:off x="0" y="0"/>
+          <a:ext cx="0" cy="0"/>
+          <a:chOff x="0" y="0"/>
+          <a:chExt cx="0" cy="0"/>
+        </a:xfrm>
+      </p:grpSpPr>
+      <p:sp>
+        <p:nvSpPr>
+          <p:cNvPr id="2" name="Title 1">
+            <a:extLst>
+              <a:ext uri="{FF2B5EF4-FFF2-40B4-BE49-F238E27FC236}">
+                <a16:creationId xmlns:a16="http://schemas.microsoft.com/office/drawing/2014/main" id="{43EE6C72-03D5-F7F0-1189-4C7BA75BAA61}"/>
+              </a:ext>
+            </a:extLst>
+          </p:cNvPr>
+          <p:cNvSpPr>
+            <a:spLocks noGrp="1"/>
+          </p:cNvSpPr>
+          <p:nvPr>
+            <p:ph type="title"/>
+          </p:nvPr>
+        </p:nvSpPr>
+        <p:spPr/>
+        <p:txBody>
+          <a:bodyPr/>
+          <a:lstStyle/>
+          <a:p>
+            <a:r>
+              <a:rPr lang="en-US" dirty="0"/>
+              <a:t>About the data</a:t>
+            </a:r>
+          </a:p>
+        </p:txBody>
+      </p:sp>
+      <p:sp>
+        <p:nvSpPr>
+          <p:cNvPr id="3" name="Content Placeholder 2">
+            <a:extLst>
+              <a:ext uri="{FF2B5EF4-FFF2-40B4-BE49-F238E27FC236}">
+                <a16:creationId xmlns:a16="http://schemas.microsoft.com/office/drawing/2014/main" id="{2CAC2674-75A1-6757-F8C2-5CD61FD6D8AE}"/>
+              </a:ext>
+            </a:extLst>
+          </p:cNvPr>
+          <p:cNvSpPr>
+            <a:spLocks noGrp="1"/>
+          </p:cNvSpPr>
+          <p:nvPr>
+            <p:ph idx="1"/>
+          </p:nvPr>
+        </p:nvSpPr>
+        <p:spPr/>
+        <p:txBody>
+          <a:bodyPr>
+            <a:normAutofit/>
+          </a:bodyPr>
+          <a:lstStyle/>
+          <a:p>
+            <a:pPr algn="l" fontAlgn="base"/>
+            <a:r>
+              <a:rPr lang="en-US" b="0" i="0" dirty="0">
+                <a:effectLst/>
+              </a:rPr>
+              <a:t>There are two classes and the goal is to distinguish between spill and non-spill using the features for a given ocean patch.</a:t>
+            </a:r>
+          </a:p>
+          <a:p>
+            <a:pPr lvl="1" fontAlgn="base"/>
+            <a:r>
+              <a:rPr lang="en-US" sz="2800" b="0" i="0" dirty="0">
+                <a:effectLst/>
+              </a:rPr>
+              <a:t>Non-Spill: negative case, or majority class.</a:t>
+            </a:r>
+          </a:p>
+          <a:p>
+            <a:pPr lvl="1" fontAlgn="base"/>
+            <a:r>
+              <a:rPr lang="en-US" sz="2800" b="0" i="0" dirty="0">
+                <a:effectLst/>
+              </a:rPr>
+              <a:t>Oil Spill: positive case, or minority class.</a:t>
+            </a:r>
+          </a:p>
+        </p:txBody>
+      </p:sp>
+      <p:sp>
+        <p:nvSpPr>
+          <p:cNvPr id="4" name="Slide Number Placeholder 3">
+            <a:extLst>
+              <a:ext uri="{FF2B5EF4-FFF2-40B4-BE49-F238E27FC236}">
+                <a16:creationId xmlns:a16="http://schemas.microsoft.com/office/drawing/2014/main" id="{13D1065C-0B23-6D9D-4687-807AC2FDE565}"/>
+              </a:ext>
+            </a:extLst>
+          </p:cNvPr>
+          <p:cNvSpPr>
+            <a:spLocks noGrp="1"/>
+          </p:cNvSpPr>
+          <p:nvPr>
+            <p:ph type="sldNum" sz="quarter" idx="12"/>
+          </p:nvPr>
+        </p:nvSpPr>
+        <p:spPr/>
+        <p:txBody>
+          <a:bodyPr/>
+          <a:lstStyle/>
+          <a:p>
+            <a:fld id="{F56AC8B8-03BA-4745-994C-072AEE7EB195}" type="slidenum">
+              <a:rPr lang="en-US" smtClean="0"/>
+              <a:t>7</a:t>
+            </a:fld>
+            <a:endParaRPr lang="en-US"/>
+          </a:p>
+        </p:txBody>
+      </p:sp>
+    </p:spTree>
+    <p:extLst>
+      <p:ext uri="{BB962C8B-B14F-4D97-AF65-F5344CB8AC3E}">
+        <p14:creationId xmlns:p14="http://schemas.microsoft.com/office/powerpoint/2010/main" val="1147944246"/>
+      </p:ext>
+    </p:extLst>
+  </p:cSld>
+  <p:clrMapOvr>
+    <a:masterClrMapping/>
+  </p:clrMapOvr>
+</p:sld>
+</file>
+
+<file path=ppt/slides/slide8.xml><?xml version="1.0" encoding="utf-8"?>
+<p:sld xmlns:a="http://schemas.openxmlformats.org/drawingml/2006/main" xmlns:r="http://schemas.openxmlformats.org/officeDocument/2006/relationships" xmlns:p="http://schemas.openxmlformats.org/presentationml/2006/main">
+  <p:cSld>
+    <p:spTree>
+      <p:nvGrpSpPr>
+        <p:cNvPr id="1" name=""/>
+        <p:cNvGrpSpPr/>
+        <p:nvPr/>
+      </p:nvGrpSpPr>
+      <p:grpSpPr>
+        <a:xfrm>
+          <a:off x="0" y="0"/>
+          <a:ext cx="0" cy="0"/>
+          <a:chOff x="0" y="0"/>
+          <a:chExt cx="0" cy="0"/>
+        </a:xfrm>
+      </p:grpSpPr>
+      <p:sp>
+        <p:nvSpPr>
+          <p:cNvPr id="4" name="Title 3">
+            <a:extLst>
+              <a:ext uri="{FF2B5EF4-FFF2-40B4-BE49-F238E27FC236}">
+                <a16:creationId xmlns:a16="http://schemas.microsoft.com/office/drawing/2014/main" id="{A8348381-F94E-1E08-559A-B780DCA65C20}"/>
+              </a:ext>
+            </a:extLst>
+          </p:cNvPr>
+          <p:cNvSpPr>
+            <a:spLocks noGrp="1"/>
+          </p:cNvSpPr>
+          <p:nvPr>
+            <p:ph type="title"/>
+          </p:nvPr>
+        </p:nvSpPr>
+        <p:spPr/>
+        <p:txBody>
+          <a:bodyPr/>
+          <a:lstStyle/>
+          <a:p>
+            <a:r>
+              <a:rPr lang="en-US" dirty="0"/>
+              <a:t>Data Exploration </a:t>
+            </a:r>
+          </a:p>
+        </p:txBody>
+      </p:sp>
+      <p:sp>
+        <p:nvSpPr>
+          <p:cNvPr id="2" name="Slide Number Placeholder 1">
+            <a:extLst>
+              <a:ext uri="{FF2B5EF4-FFF2-40B4-BE49-F238E27FC236}">
+                <a16:creationId xmlns:a16="http://schemas.microsoft.com/office/drawing/2014/main" id="{870EF095-C38D-D53A-343F-4F2C4877626D}"/>
+              </a:ext>
+            </a:extLst>
+          </p:cNvPr>
+          <p:cNvSpPr>
+            <a:spLocks noGrp="1"/>
+          </p:cNvSpPr>
+          <p:nvPr>
+            <p:ph type="sldNum" sz="quarter" idx="12"/>
+          </p:nvPr>
+        </p:nvSpPr>
+        <p:spPr/>
+        <p:txBody>
+          <a:bodyPr/>
+          <a:lstStyle/>
+          <a:p>
+            <a:fld id="{F56AC8B8-03BA-4745-994C-072AEE7EB195}" type="slidenum">
+              <a:rPr lang="en-US" smtClean="0"/>
+              <a:t>8</a:t>
+            </a:fld>
+            <a:endParaRPr lang="en-US"/>
+          </a:p>
+        </p:txBody>
+      </p:sp>
+    </p:spTree>
+    <p:extLst>
+      <p:ext uri="{BB962C8B-B14F-4D97-AF65-F5344CB8AC3E}">
+        <p14:creationId xmlns:p14="http://schemas.microsoft.com/office/powerpoint/2010/main" val="2646417190"/>
+      </p:ext>
+    </p:extLst>
+  </p:cSld>
+  <p:clrMapOvr>
+    <a:masterClrMapping/>
+  </p:clrMapOvr>
+</p:sld>
+</file>
+
+<file path=ppt/slides/slide9.xml><?xml version="1.0" encoding="utf-8"?>
+<p:sld xmlns:a="http://schemas.openxmlformats.org/drawingml/2006/main" xmlns:r="http://schemas.openxmlformats.org/officeDocument/2006/relationships" xmlns:p="http://schemas.openxmlformats.org/presentationml/2006/main">
+  <p:cSld>
+    <p:spTree>
+      <p:nvGrpSpPr>
+        <p:cNvPr id="1" name=""/>
+        <p:cNvGrpSpPr/>
+        <p:nvPr/>
+      </p:nvGrpSpPr>
+      <p:grpSpPr>
+        <a:xfrm>
+          <a:off x="0" y="0"/>
+          <a:ext cx="0" cy="0"/>
+          <a:chOff x="0" y="0"/>
+          <a:chExt cx="0" cy="0"/>
+        </a:xfrm>
+      </p:grpSpPr>
+      <p:sp>
+        <p:nvSpPr>
+          <p:cNvPr id="2" name="Title 1">
+            <a:extLst>
+              <a:ext uri="{FF2B5EF4-FFF2-40B4-BE49-F238E27FC236}">
+                <a16:creationId xmlns:a16="http://schemas.microsoft.com/office/drawing/2014/main" id="{43EE6C72-03D5-F7F0-1189-4C7BA75BAA61}"/>
+              </a:ext>
+            </a:extLst>
+          </p:cNvPr>
+          <p:cNvSpPr>
+            <a:spLocks noGrp="1"/>
+          </p:cNvSpPr>
+          <p:nvPr>
+            <p:ph type="title"/>
+          </p:nvPr>
+        </p:nvSpPr>
+        <p:spPr/>
+        <p:txBody>
+          <a:bodyPr/>
+          <a:lstStyle/>
+          <a:p>
+            <a:r>
+              <a:rPr lang="en-US" dirty="0"/>
+              <a:t>Data exploration </a:t>
+            </a:r>
+          </a:p>
+        </p:txBody>
+      </p:sp>
+      <p:sp>
+        <p:nvSpPr>
+          <p:cNvPr id="3" name="Content Placeholder 2">
+            <a:extLst>
+              <a:ext uri="{FF2B5EF4-FFF2-40B4-BE49-F238E27FC236}">
+                <a16:creationId xmlns:a16="http://schemas.microsoft.com/office/drawing/2014/main" id="{2CAC2674-75A1-6757-F8C2-5CD61FD6D8AE}"/>
+              </a:ext>
+            </a:extLst>
+          </p:cNvPr>
+          <p:cNvSpPr>
+            <a:spLocks noGrp="1"/>
+          </p:cNvSpPr>
+          <p:nvPr>
+            <p:ph idx="1"/>
+          </p:nvPr>
+        </p:nvSpPr>
+        <p:spPr/>
+        <p:txBody>
+          <a:bodyPr/>
+          <a:lstStyle/>
+          <a:p>
+            <a:r>
+              <a:rPr lang="en-US" dirty="0"/>
+              <a:t>There are 50 columns and 937 rows.</a:t>
+            </a:r>
+          </a:p>
+          <a:p>
+            <a:r>
+              <a:rPr lang="en-US" dirty="0"/>
+              <a:t>The data set has no missing values but has a lot of FALSY values, we will elaborate more later in the section.</a:t>
+            </a:r>
+          </a:p>
+          <a:p>
+            <a:r>
+              <a:rPr lang="en-US" b="0" i="0" dirty="0">
+                <a:effectLst/>
+              </a:rPr>
+              <a:t>The normal case is no oil spill assigned the class label of 0, whereas an oil spill is indicated by a class label of 1.</a:t>
+            </a:r>
+          </a:p>
+          <a:p>
+            <a:r>
+              <a:rPr lang="en-US" b="0" i="0" dirty="0">
+                <a:effectLst/>
+              </a:rPr>
+              <a:t>As we previously said, There are 896 cases of no oil spill and 41 cases of an oil spill.</a:t>
+            </a:r>
+          </a:p>
+          <a:p>
+            <a:endParaRPr lang="en-US" dirty="0"/>
+          </a:p>
+        </p:txBody>
+      </p:sp>
+      <p:sp>
+        <p:nvSpPr>
+          <p:cNvPr id="4" name="Slide Number Placeholder 3">
+            <a:extLst>
+              <a:ext uri="{FF2B5EF4-FFF2-40B4-BE49-F238E27FC236}">
+                <a16:creationId xmlns:a16="http://schemas.microsoft.com/office/drawing/2014/main" id="{AB66E3E2-AAD8-F512-2126-60AF9A4F7C65}"/>
+              </a:ext>
+            </a:extLst>
+          </p:cNvPr>
+          <p:cNvSpPr>
+            <a:spLocks noGrp="1"/>
+          </p:cNvSpPr>
+          <p:nvPr>
+            <p:ph type="sldNum" sz="quarter" idx="12"/>
+          </p:nvPr>
+        </p:nvSpPr>
+        <p:spPr/>
+        <p:txBody>
+          <a:bodyPr/>
+          <a:lstStyle/>
+          <a:p>
+            <a:fld id="{F56AC8B8-03BA-4745-994C-072AEE7EB195}" type="slidenum">
+              <a:rPr lang="en-US" smtClean="0"/>
+              <a:t>9</a:t>
+            </a:fld>
+            <a:endParaRPr lang="en-US"/>
+          </a:p>
+        </p:txBody>
+      </p:sp>
+    </p:spTree>
+    <p:extLst>
+      <p:ext uri="{BB962C8B-B14F-4D97-AF65-F5344CB8AC3E}">
+        <p14:creationId xmlns:p14="http://schemas.microsoft.com/office/powerpoint/2010/main" val="3220050771"/>
       </p:ext>
     </p:extLst>
   </p:cSld>

</xml_diff>